<commit_message>
Banking-service : 계좌 등록 구현
web 으로 부터 계좌 정보를 받으면, 이를 아래의 process 에 따라 처리된다.

1. controller 를 통해 입려된 정보로 command data 를 build 하여  port.in(UserCase) registerBankAccount method 로 보낸다.
2. Usecase 구현체인 service 에서 이를 받아 business logic 을 처리한다.
   - 요청한 사람의 membershipId 가 유효한지 Membership service 에 조회를 요청한다. (미구현)
   - 입력된 계좌 정보가 유효한지 해당 은행 서비스로 부터 확인한다. (현재 상태에서 구현 불가능 하므로 해당 요청 port - apdater 에서 임의로 확인하여 응답함. )
   - 위 두가지 검증에서 유효하지 않은 경우 error 반환 (미구현)
   - 검증을 통과한 경우,  영속성 요청을 보내는 out.port,  해당 구현체 persistence adapter 를 통해 DB 에 저장

해당 service  container 를 생성하기 위한 docker-compose 설정을 추가함 (membeship-service 와 동일)

현재까지 작업한 MSA 작업 과정을 pptx 에 도식화 함.
</commit_message>
<xml_diff>
--- a/document/Hexagonal Architecture (Membership–Service).pptx
+++ b/document/Hexagonal Architecture (Membership–Service).pptx
@@ -6,6 +6,7 @@
   </p:sldMasterIdLst>
   <p:sldIdLst>
     <p:sldId id="256" r:id="rId2"/>
+    <p:sldId id="257" r:id="rId3"/>
   </p:sldIdLst>
   <p:sldSz cx="12192000" cy="6858000"/>
   <p:notesSz cx="6858000" cy="9144000"/>
@@ -259,7 +260,7 @@
           <a:p>
             <a:fld id="{ED0257EB-9265-4629-88BF-25DC87151554}" type="datetimeFigureOut">
               <a:rPr lang="ko-KR" altLang="en-US" smtClean="0"/>
-              <a:t>2023-11-17</a:t>
+              <a:t>2023-11-24</a:t>
             </a:fld>
             <a:endParaRPr lang="ko-KR" altLang="en-US"/>
           </a:p>
@@ -457,7 +458,7 @@
           <a:p>
             <a:fld id="{ED0257EB-9265-4629-88BF-25DC87151554}" type="datetimeFigureOut">
               <a:rPr lang="ko-KR" altLang="en-US" smtClean="0"/>
-              <a:t>2023-11-17</a:t>
+              <a:t>2023-11-24</a:t>
             </a:fld>
             <a:endParaRPr lang="ko-KR" altLang="en-US"/>
           </a:p>
@@ -665,7 +666,7 @@
           <a:p>
             <a:fld id="{ED0257EB-9265-4629-88BF-25DC87151554}" type="datetimeFigureOut">
               <a:rPr lang="ko-KR" altLang="en-US" smtClean="0"/>
-              <a:t>2023-11-17</a:t>
+              <a:t>2023-11-24</a:t>
             </a:fld>
             <a:endParaRPr lang="ko-KR" altLang="en-US"/>
           </a:p>
@@ -863,7 +864,7 @@
           <a:p>
             <a:fld id="{ED0257EB-9265-4629-88BF-25DC87151554}" type="datetimeFigureOut">
               <a:rPr lang="ko-KR" altLang="en-US" smtClean="0"/>
-              <a:t>2023-11-17</a:t>
+              <a:t>2023-11-24</a:t>
             </a:fld>
             <a:endParaRPr lang="ko-KR" altLang="en-US"/>
           </a:p>
@@ -1138,7 +1139,7 @@
           <a:p>
             <a:fld id="{ED0257EB-9265-4629-88BF-25DC87151554}" type="datetimeFigureOut">
               <a:rPr lang="ko-KR" altLang="en-US" smtClean="0"/>
-              <a:t>2023-11-17</a:t>
+              <a:t>2023-11-24</a:t>
             </a:fld>
             <a:endParaRPr lang="ko-KR" altLang="en-US"/>
           </a:p>
@@ -1403,7 +1404,7 @@
           <a:p>
             <a:fld id="{ED0257EB-9265-4629-88BF-25DC87151554}" type="datetimeFigureOut">
               <a:rPr lang="ko-KR" altLang="en-US" smtClean="0"/>
-              <a:t>2023-11-17</a:t>
+              <a:t>2023-11-24</a:t>
             </a:fld>
             <a:endParaRPr lang="ko-KR" altLang="en-US"/>
           </a:p>
@@ -1815,7 +1816,7 @@
           <a:p>
             <a:fld id="{ED0257EB-9265-4629-88BF-25DC87151554}" type="datetimeFigureOut">
               <a:rPr lang="ko-KR" altLang="en-US" smtClean="0"/>
-              <a:t>2023-11-17</a:t>
+              <a:t>2023-11-24</a:t>
             </a:fld>
             <a:endParaRPr lang="ko-KR" altLang="en-US"/>
           </a:p>
@@ -1956,7 +1957,7 @@
           <a:p>
             <a:fld id="{ED0257EB-9265-4629-88BF-25DC87151554}" type="datetimeFigureOut">
               <a:rPr lang="ko-KR" altLang="en-US" smtClean="0"/>
-              <a:t>2023-11-17</a:t>
+              <a:t>2023-11-24</a:t>
             </a:fld>
             <a:endParaRPr lang="ko-KR" altLang="en-US"/>
           </a:p>
@@ -2069,7 +2070,7 @@
           <a:p>
             <a:fld id="{ED0257EB-9265-4629-88BF-25DC87151554}" type="datetimeFigureOut">
               <a:rPr lang="ko-KR" altLang="en-US" smtClean="0"/>
-              <a:t>2023-11-17</a:t>
+              <a:t>2023-11-24</a:t>
             </a:fld>
             <a:endParaRPr lang="ko-KR" altLang="en-US"/>
           </a:p>
@@ -2380,7 +2381,7 @@
           <a:p>
             <a:fld id="{ED0257EB-9265-4629-88BF-25DC87151554}" type="datetimeFigureOut">
               <a:rPr lang="ko-KR" altLang="en-US" smtClean="0"/>
-              <a:t>2023-11-17</a:t>
+              <a:t>2023-11-24</a:t>
             </a:fld>
             <a:endParaRPr lang="ko-KR" altLang="en-US"/>
           </a:p>
@@ -2668,7 +2669,7 @@
           <a:p>
             <a:fld id="{ED0257EB-9265-4629-88BF-25DC87151554}" type="datetimeFigureOut">
               <a:rPr lang="ko-KR" altLang="en-US" smtClean="0"/>
-              <a:t>2023-11-17</a:t>
+              <a:t>2023-11-24</a:t>
             </a:fld>
             <a:endParaRPr lang="ko-KR" altLang="en-US"/>
           </a:p>
@@ -2909,7 +2910,7 @@
           <a:p>
             <a:fld id="{ED0257EB-9265-4629-88BF-25DC87151554}" type="datetimeFigureOut">
               <a:rPr lang="ko-KR" altLang="en-US" smtClean="0"/>
-              <a:t>2023-11-17</a:t>
+              <a:t>2023-11-24</a:t>
             </a:fld>
             <a:endParaRPr lang="ko-KR" altLang="en-US"/>
           </a:p>
@@ -9625,6 +9626,3287 @@
 </p:sld>
 </file>
 
+<file path=ppt/slides/slide2.xml><?xml version="1.0" encoding="utf-8"?>
+<p:sld xmlns:a="http://schemas.openxmlformats.org/drawingml/2006/main" xmlns:r="http://schemas.openxmlformats.org/officeDocument/2006/relationships" xmlns:p="http://schemas.openxmlformats.org/presentationml/2006/main">
+  <p:cSld>
+    <p:spTree>
+      <p:nvGrpSpPr>
+        <p:cNvPr id="1" name=""/>
+        <p:cNvGrpSpPr/>
+        <p:nvPr/>
+      </p:nvGrpSpPr>
+      <p:grpSpPr>
+        <a:xfrm>
+          <a:off x="0" y="0"/>
+          <a:ext cx="0" cy="0"/>
+          <a:chOff x="0" y="0"/>
+          <a:chExt cx="0" cy="0"/>
+        </a:xfrm>
+      </p:grpSpPr>
+      <p:sp>
+        <p:nvSpPr>
+          <p:cNvPr id="4" name="TextBox 3">
+            <a:extLst>
+              <a:ext uri="{FF2B5EF4-FFF2-40B4-BE49-F238E27FC236}">
+                <a16:creationId xmlns:a16="http://schemas.microsoft.com/office/drawing/2014/main" id="{5C8F1494-3A24-B750-2025-6678AE5AF394}"/>
+              </a:ext>
+            </a:extLst>
+          </p:cNvPr>
+          <p:cNvSpPr txBox="1"/>
+          <p:nvPr/>
+        </p:nvSpPr>
+        <p:spPr>
+          <a:xfrm>
+            <a:off x="2397172" y="372967"/>
+            <a:ext cx="7319549" cy="400110"/>
+          </a:xfrm>
+          <a:prstGeom prst="rect">
+            <a:avLst/>
+          </a:prstGeom>
+          <a:noFill/>
+        </p:spPr>
+        <p:txBody>
+          <a:bodyPr wrap="square" rtlCol="0">
+            <a:spAutoFit/>
+          </a:bodyPr>
+          <a:lstStyle/>
+          <a:p>
+            <a:pPr algn="ctr"/>
+            <a:r>
+              <a:rPr lang="en-US" altLang="ko-KR" sz="2000" b="1" dirty="0"/>
+              <a:t>MSA </a:t>
+            </a:r>
+            <a:r>
+              <a:rPr lang="ko-KR" altLang="en-US" sz="2000" b="1" dirty="0"/>
+              <a:t>구축 과정 정리</a:t>
+            </a:r>
+          </a:p>
+        </p:txBody>
+      </p:sp>
+      <p:sp>
+        <p:nvSpPr>
+          <p:cNvPr id="6" name="직사각형 5">
+            <a:extLst>
+              <a:ext uri="{FF2B5EF4-FFF2-40B4-BE49-F238E27FC236}">
+                <a16:creationId xmlns:a16="http://schemas.microsoft.com/office/drawing/2014/main" id="{DE610709-3108-CBF7-53C9-13A0E27EA881}"/>
+              </a:ext>
+            </a:extLst>
+          </p:cNvPr>
+          <p:cNvSpPr/>
+          <p:nvPr/>
+        </p:nvSpPr>
+        <p:spPr>
+          <a:xfrm>
+            <a:off x="256858" y="1402830"/>
+            <a:ext cx="278516" cy="4746864"/>
+          </a:xfrm>
+          <a:prstGeom prst="rect">
+            <a:avLst/>
+          </a:prstGeom>
+        </p:spPr>
+        <p:style>
+          <a:lnRef idx="2">
+            <a:schemeClr val="accent6"/>
+          </a:lnRef>
+          <a:fillRef idx="1">
+            <a:schemeClr val="lt1"/>
+          </a:fillRef>
+          <a:effectRef idx="0">
+            <a:schemeClr val="accent6"/>
+          </a:effectRef>
+          <a:fontRef idx="minor">
+            <a:schemeClr val="dk1"/>
+          </a:fontRef>
+        </p:style>
+        <p:txBody>
+          <a:bodyPr rtlCol="0" anchor="ctr"/>
+          <a:lstStyle/>
+          <a:p>
+            <a:pPr algn="ctr"/>
+            <a:r>
+              <a:rPr lang="en-US" altLang="ko-KR" sz="1100" dirty="0">
+                <a:solidFill>
+                  <a:schemeClr val="accent6">
+                    <a:lumMod val="75000"/>
+                  </a:schemeClr>
+                </a:solidFill>
+              </a:rPr>
+              <a:t>Web</a:t>
+            </a:r>
+            <a:endParaRPr lang="ko-KR" altLang="en-US" sz="1400" dirty="0">
+              <a:solidFill>
+                <a:schemeClr val="accent6">
+                  <a:lumMod val="75000"/>
+                </a:schemeClr>
+              </a:solidFill>
+            </a:endParaRPr>
+          </a:p>
+        </p:txBody>
+      </p:sp>
+      <p:sp>
+        <p:nvSpPr>
+          <p:cNvPr id="7" name="직사각형 6">
+            <a:extLst>
+              <a:ext uri="{FF2B5EF4-FFF2-40B4-BE49-F238E27FC236}">
+                <a16:creationId xmlns:a16="http://schemas.microsoft.com/office/drawing/2014/main" id="{76584C2D-A0F4-AF27-CB99-4C880FC82C70}"/>
+              </a:ext>
+            </a:extLst>
+          </p:cNvPr>
+          <p:cNvSpPr/>
+          <p:nvPr/>
+        </p:nvSpPr>
+        <p:spPr>
+          <a:xfrm>
+            <a:off x="11563352" y="1402830"/>
+            <a:ext cx="278516" cy="4746864"/>
+          </a:xfrm>
+          <a:prstGeom prst="rect">
+            <a:avLst/>
+          </a:prstGeom>
+        </p:spPr>
+        <p:style>
+          <a:lnRef idx="2">
+            <a:schemeClr val="accent6"/>
+          </a:lnRef>
+          <a:fillRef idx="1">
+            <a:schemeClr val="lt1"/>
+          </a:fillRef>
+          <a:effectRef idx="0">
+            <a:schemeClr val="accent6"/>
+          </a:effectRef>
+          <a:fontRef idx="minor">
+            <a:schemeClr val="dk1"/>
+          </a:fontRef>
+        </p:style>
+        <p:txBody>
+          <a:bodyPr rtlCol="0" anchor="ctr"/>
+          <a:lstStyle/>
+          <a:p>
+            <a:pPr algn="ctr"/>
+            <a:r>
+              <a:rPr lang="en-US" altLang="ko-KR" sz="1100" dirty="0">
+                <a:solidFill>
+                  <a:schemeClr val="accent6">
+                    <a:lumMod val="75000"/>
+                  </a:schemeClr>
+                </a:solidFill>
+              </a:rPr>
+              <a:t>DB</a:t>
+            </a:r>
+            <a:endParaRPr lang="ko-KR" altLang="en-US" sz="1600" dirty="0">
+              <a:solidFill>
+                <a:schemeClr val="accent6">
+                  <a:lumMod val="75000"/>
+                </a:schemeClr>
+              </a:solidFill>
+            </a:endParaRPr>
+          </a:p>
+        </p:txBody>
+      </p:sp>
+      <p:sp>
+        <p:nvSpPr>
+          <p:cNvPr id="8" name="직사각형 7">
+            <a:extLst>
+              <a:ext uri="{FF2B5EF4-FFF2-40B4-BE49-F238E27FC236}">
+                <a16:creationId xmlns:a16="http://schemas.microsoft.com/office/drawing/2014/main" id="{AA8A0B42-DF10-0C37-92F9-567827F6CC59}"/>
+              </a:ext>
+            </a:extLst>
+          </p:cNvPr>
+          <p:cNvSpPr/>
+          <p:nvPr/>
+        </p:nvSpPr>
+        <p:spPr>
+          <a:xfrm>
+            <a:off x="811973" y="6350633"/>
+            <a:ext cx="10478261" cy="268800"/>
+          </a:xfrm>
+          <a:prstGeom prst="rect">
+            <a:avLst/>
+          </a:prstGeom>
+        </p:spPr>
+        <p:style>
+          <a:lnRef idx="2">
+            <a:schemeClr val="accent6"/>
+          </a:lnRef>
+          <a:fillRef idx="1">
+            <a:schemeClr val="lt1"/>
+          </a:fillRef>
+          <a:effectRef idx="0">
+            <a:schemeClr val="accent6"/>
+          </a:effectRef>
+          <a:fontRef idx="minor">
+            <a:schemeClr val="dk1"/>
+          </a:fontRef>
+        </p:style>
+        <p:txBody>
+          <a:bodyPr rtlCol="0" anchor="ctr"/>
+          <a:lstStyle/>
+          <a:p>
+            <a:pPr algn="ctr"/>
+            <a:r>
+              <a:rPr lang="en-US" altLang="ko-KR" sz="1100" dirty="0">
+                <a:solidFill>
+                  <a:schemeClr val="accent6">
+                    <a:lumMod val="75000"/>
+                  </a:schemeClr>
+                </a:solidFill>
+              </a:rPr>
+              <a:t>External Service</a:t>
+            </a:r>
+            <a:endParaRPr lang="ko-KR" altLang="en-US" sz="1400" dirty="0">
+              <a:solidFill>
+                <a:schemeClr val="accent6">
+                  <a:lumMod val="75000"/>
+                </a:schemeClr>
+              </a:solidFill>
+            </a:endParaRPr>
+          </a:p>
+        </p:txBody>
+      </p:sp>
+      <p:grpSp>
+        <p:nvGrpSpPr>
+          <p:cNvPr id="46" name="그룹 45">
+            <a:extLst>
+              <a:ext uri="{FF2B5EF4-FFF2-40B4-BE49-F238E27FC236}">
+                <a16:creationId xmlns:a16="http://schemas.microsoft.com/office/drawing/2014/main" id="{7D3F52E3-DB2B-2C92-05FB-D0C7F483AEF1}"/>
+              </a:ext>
+            </a:extLst>
+          </p:cNvPr>
+          <p:cNvGrpSpPr/>
+          <p:nvPr/>
+        </p:nvGrpSpPr>
+        <p:grpSpPr>
+          <a:xfrm>
+            <a:off x="7954506" y="238567"/>
+            <a:ext cx="3760388" cy="1041036"/>
+            <a:chOff x="7954506" y="238567"/>
+            <a:chExt cx="3760388" cy="1041036"/>
+          </a:xfrm>
+        </p:grpSpPr>
+        <p:grpSp>
+          <p:nvGrpSpPr>
+            <p:cNvPr id="43" name="그룹 42">
+              <a:extLst>
+                <a:ext uri="{FF2B5EF4-FFF2-40B4-BE49-F238E27FC236}">
+                  <a16:creationId xmlns:a16="http://schemas.microsoft.com/office/drawing/2014/main" id="{3E0DEDBD-0063-5383-13EF-FE3856E9055A}"/>
+                </a:ext>
+              </a:extLst>
+            </p:cNvPr>
+            <p:cNvGrpSpPr/>
+            <p:nvPr/>
+          </p:nvGrpSpPr>
+          <p:grpSpPr>
+            <a:xfrm>
+              <a:off x="7954506" y="238567"/>
+              <a:ext cx="3760388" cy="1041036"/>
+              <a:chOff x="4633686" y="2776961"/>
+              <a:chExt cx="3760388" cy="1041036"/>
+            </a:xfrm>
+          </p:grpSpPr>
+          <p:grpSp>
+            <p:nvGrpSpPr>
+              <p:cNvPr id="23" name="그룹 22">
+                <a:extLst>
+                  <a:ext uri="{FF2B5EF4-FFF2-40B4-BE49-F238E27FC236}">
+                    <a16:creationId xmlns:a16="http://schemas.microsoft.com/office/drawing/2014/main" id="{8D7E4CC8-5750-EE23-694A-46DDA094E98D}"/>
+                  </a:ext>
+                </a:extLst>
+              </p:cNvPr>
+              <p:cNvGrpSpPr/>
+              <p:nvPr/>
+            </p:nvGrpSpPr>
+            <p:grpSpPr>
+              <a:xfrm>
+                <a:off x="5007936" y="2801265"/>
+                <a:ext cx="3003753" cy="990205"/>
+                <a:chOff x="4546382" y="3573572"/>
+                <a:chExt cx="3003753" cy="990205"/>
+              </a:xfrm>
+            </p:grpSpPr>
+            <p:sp>
+              <p:nvSpPr>
+                <p:cNvPr id="24" name="육각형 23">
+                  <a:extLst>
+                    <a:ext uri="{FF2B5EF4-FFF2-40B4-BE49-F238E27FC236}">
+                      <a16:creationId xmlns:a16="http://schemas.microsoft.com/office/drawing/2014/main" id="{535D03B9-750A-BE3E-1658-E629C19BDC68}"/>
+                    </a:ext>
+                  </a:extLst>
+                </p:cNvPr>
+                <p:cNvSpPr/>
+                <p:nvPr/>
+              </p:nvSpPr>
+              <p:spPr>
+                <a:xfrm>
+                  <a:off x="4546382" y="3793746"/>
+                  <a:ext cx="3003753" cy="558725"/>
+                </a:xfrm>
+                <a:prstGeom prst="hexagon">
+                  <a:avLst/>
+                </a:prstGeom>
+                <a:solidFill>
+                  <a:schemeClr val="accent2">
+                    <a:lumMod val="20000"/>
+                    <a:lumOff val="80000"/>
+                  </a:schemeClr>
+                </a:solidFill>
+                <a:ln>
+                  <a:noFill/>
+                </a:ln>
+              </p:spPr>
+              <p:style>
+                <a:lnRef idx="2">
+                  <a:schemeClr val="accent1">
+                    <a:shade val="15000"/>
+                  </a:schemeClr>
+                </a:lnRef>
+                <a:fillRef idx="1">
+                  <a:schemeClr val="accent1"/>
+                </a:fillRef>
+                <a:effectRef idx="0">
+                  <a:schemeClr val="accent1"/>
+                </a:effectRef>
+                <a:fontRef idx="minor">
+                  <a:schemeClr val="lt1"/>
+                </a:fontRef>
+              </p:style>
+              <p:txBody>
+                <a:bodyPr rtlCol="0" anchor="ctr"/>
+                <a:lstStyle/>
+                <a:p>
+                  <a:pPr algn="ctr"/>
+                  <a:endParaRPr lang="ko-KR" altLang="en-US"/>
+                </a:p>
+              </p:txBody>
+            </p:sp>
+            <p:sp>
+              <p:nvSpPr>
+                <p:cNvPr id="25" name="육각형 24">
+                  <a:extLst>
+                    <a:ext uri="{FF2B5EF4-FFF2-40B4-BE49-F238E27FC236}">
+                      <a16:creationId xmlns:a16="http://schemas.microsoft.com/office/drawing/2014/main" id="{E3B47E22-389C-E961-32EF-62E4266D3F69}"/>
+                    </a:ext>
+                  </a:extLst>
+                </p:cNvPr>
+                <p:cNvSpPr/>
+                <p:nvPr/>
+              </p:nvSpPr>
+              <p:spPr>
+                <a:xfrm>
+                  <a:off x="5014346" y="3792579"/>
+                  <a:ext cx="2188085" cy="559892"/>
+                </a:xfrm>
+                <a:prstGeom prst="hexagon">
+                  <a:avLst/>
+                </a:prstGeom>
+                <a:solidFill>
+                  <a:schemeClr val="accent5">
+                    <a:lumMod val="40000"/>
+                    <a:lumOff val="60000"/>
+                  </a:schemeClr>
+                </a:solidFill>
+                <a:ln>
+                  <a:noFill/>
+                </a:ln>
+              </p:spPr>
+              <p:style>
+                <a:lnRef idx="2">
+                  <a:schemeClr val="accent1">
+                    <a:shade val="15000"/>
+                  </a:schemeClr>
+                </a:lnRef>
+                <a:fillRef idx="1">
+                  <a:schemeClr val="accent1"/>
+                </a:fillRef>
+                <a:effectRef idx="0">
+                  <a:schemeClr val="accent1"/>
+                </a:effectRef>
+                <a:fontRef idx="minor">
+                  <a:schemeClr val="lt1"/>
+                </a:fontRef>
+              </p:style>
+              <p:txBody>
+                <a:bodyPr rtlCol="0" anchor="ctr"/>
+                <a:lstStyle/>
+                <a:p>
+                  <a:pPr algn="ctr"/>
+                  <a:endParaRPr lang="ko-KR" altLang="en-US"/>
+                </a:p>
+              </p:txBody>
+            </p:sp>
+            <p:sp>
+              <p:nvSpPr>
+                <p:cNvPr id="26" name="육각형 25">
+                  <a:extLst>
+                    <a:ext uri="{FF2B5EF4-FFF2-40B4-BE49-F238E27FC236}">
+                      <a16:creationId xmlns:a16="http://schemas.microsoft.com/office/drawing/2014/main" id="{F614ADAA-05CC-BF96-BCFD-A8E6FDC69B62}"/>
+                    </a:ext>
+                  </a:extLst>
+                </p:cNvPr>
+                <p:cNvSpPr/>
+                <p:nvPr/>
+              </p:nvSpPr>
+              <p:spPr>
+                <a:xfrm rot="1800000">
+                  <a:off x="5493560" y="3573572"/>
+                  <a:ext cx="1118126" cy="990205"/>
+                </a:xfrm>
+                <a:prstGeom prst="hexagon">
+                  <a:avLst>
+                    <a:gd name="adj" fmla="val 26801"/>
+                    <a:gd name="vf" fmla="val 115470"/>
+                  </a:avLst>
+                </a:prstGeom>
+                <a:ln>
+                  <a:noFill/>
+                </a:ln>
+              </p:spPr>
+              <p:style>
+                <a:lnRef idx="2">
+                  <a:schemeClr val="accent1">
+                    <a:shade val="15000"/>
+                  </a:schemeClr>
+                </a:lnRef>
+                <a:fillRef idx="1">
+                  <a:schemeClr val="accent1"/>
+                </a:fillRef>
+                <a:effectRef idx="0">
+                  <a:schemeClr val="accent1"/>
+                </a:effectRef>
+                <a:fontRef idx="minor">
+                  <a:schemeClr val="lt1"/>
+                </a:fontRef>
+              </p:style>
+              <p:txBody>
+                <a:bodyPr rtlCol="0" anchor="ctr"/>
+                <a:lstStyle/>
+                <a:p>
+                  <a:pPr algn="ctr"/>
+                  <a:endParaRPr lang="ko-KR" altLang="en-US"/>
+                </a:p>
+              </p:txBody>
+            </p:sp>
+            <p:sp>
+              <p:nvSpPr>
+                <p:cNvPr id="27" name="육각형 26">
+                  <a:extLst>
+                    <a:ext uri="{FF2B5EF4-FFF2-40B4-BE49-F238E27FC236}">
+                      <a16:creationId xmlns:a16="http://schemas.microsoft.com/office/drawing/2014/main" id="{BF4B36B5-2E4F-93F0-870A-EE5E5D81CED1}"/>
+                    </a:ext>
+                  </a:extLst>
+                </p:cNvPr>
+                <p:cNvSpPr/>
+                <p:nvPr/>
+              </p:nvSpPr>
+              <p:spPr>
+                <a:xfrm>
+                  <a:off x="4789270" y="3972325"/>
+                  <a:ext cx="1995068" cy="192697"/>
+                </a:xfrm>
+                <a:prstGeom prst="hexagon">
+                  <a:avLst/>
+                </a:prstGeom>
+                <a:solidFill>
+                  <a:schemeClr val="accent4">
+                    <a:lumMod val="75000"/>
+                  </a:schemeClr>
+                </a:solidFill>
+                <a:ln>
+                  <a:noFill/>
+                </a:ln>
+              </p:spPr>
+              <p:style>
+                <a:lnRef idx="2">
+                  <a:schemeClr val="accent1">
+                    <a:shade val="15000"/>
+                  </a:schemeClr>
+                </a:lnRef>
+                <a:fillRef idx="1">
+                  <a:schemeClr val="accent1"/>
+                </a:fillRef>
+                <a:effectRef idx="0">
+                  <a:schemeClr val="accent1"/>
+                </a:effectRef>
+                <a:fontRef idx="minor">
+                  <a:schemeClr val="lt1"/>
+                </a:fontRef>
+              </p:style>
+              <p:txBody>
+                <a:bodyPr rtlCol="0" anchor="ctr"/>
+                <a:lstStyle/>
+                <a:p>
+                  <a:pPr algn="ctr"/>
+                  <a:r>
+                    <a:rPr lang="en-US" altLang="ko-KR" sz="1100" dirty="0"/>
+                    <a:t>           Domain</a:t>
+                  </a:r>
+                  <a:endParaRPr lang="ko-KR" altLang="en-US" sz="1100" dirty="0"/>
+                </a:p>
+              </p:txBody>
+            </p:sp>
+          </p:grpSp>
+          <p:sp>
+            <p:nvSpPr>
+              <p:cNvPr id="29" name="TextBox 28">
+                <a:extLst>
+                  <a:ext uri="{FF2B5EF4-FFF2-40B4-BE49-F238E27FC236}">
+                    <a16:creationId xmlns:a16="http://schemas.microsoft.com/office/drawing/2014/main" id="{3908085D-6B88-A218-56B2-8718DE5AF4EB}"/>
+                  </a:ext>
+                </a:extLst>
+              </p:cNvPr>
+              <p:cNvSpPr txBox="1"/>
+              <p:nvPr/>
+            </p:nvSpPr>
+            <p:spPr>
+              <a:xfrm>
+                <a:off x="6013423" y="2901419"/>
+                <a:ext cx="992777" cy="276999"/>
+              </a:xfrm>
+              <a:prstGeom prst="rect">
+                <a:avLst/>
+              </a:prstGeom>
+              <a:noFill/>
+            </p:spPr>
+            <p:txBody>
+              <a:bodyPr wrap="square" rtlCol="0">
+                <a:spAutoFit/>
+              </a:bodyPr>
+              <a:lstStyle/>
+              <a:p>
+                <a:pPr algn="ctr"/>
+                <a:r>
+                  <a:rPr lang="en-US" altLang="ko-KR" sz="1200" b="1" dirty="0">
+                    <a:solidFill>
+                      <a:schemeClr val="bg1">
+                        <a:lumMod val="95000"/>
+                      </a:schemeClr>
+                    </a:solidFill>
+                  </a:rPr>
+                  <a:t>Service</a:t>
+                </a:r>
+                <a:endParaRPr lang="ko-KR" altLang="en-US" sz="1400" b="1" dirty="0">
+                  <a:solidFill>
+                    <a:schemeClr val="bg1">
+                      <a:lumMod val="95000"/>
+                    </a:schemeClr>
+                  </a:solidFill>
+                </a:endParaRPr>
+              </a:p>
+            </p:txBody>
+          </p:sp>
+          <p:sp>
+            <p:nvSpPr>
+              <p:cNvPr id="30" name="TextBox 29">
+                <a:extLst>
+                  <a:ext uri="{FF2B5EF4-FFF2-40B4-BE49-F238E27FC236}">
+                    <a16:creationId xmlns:a16="http://schemas.microsoft.com/office/drawing/2014/main" id="{B25BAE87-937E-18EF-8038-513B2CB7088E}"/>
+                  </a:ext>
+                </a:extLst>
+              </p:cNvPr>
+              <p:cNvSpPr txBox="1"/>
+              <p:nvPr/>
+            </p:nvSpPr>
+            <p:spPr>
+              <a:xfrm>
+                <a:off x="5364369" y="3587165"/>
+                <a:ext cx="992777" cy="230832"/>
+              </a:xfrm>
+              <a:prstGeom prst="rect">
+                <a:avLst/>
+              </a:prstGeom>
+              <a:noFill/>
+            </p:spPr>
+            <p:txBody>
+              <a:bodyPr wrap="square" rtlCol="0">
+                <a:spAutoFit/>
+              </a:bodyPr>
+              <a:lstStyle/>
+              <a:p>
+                <a:pPr algn="ctr"/>
+                <a:r>
+                  <a:rPr lang="en-US" altLang="ko-KR" sz="900" b="1" dirty="0"/>
+                  <a:t>Application</a:t>
+                </a:r>
+                <a:endParaRPr lang="ko-KR" altLang="en-US" sz="1400" b="1" dirty="0"/>
+              </a:p>
+            </p:txBody>
+          </p:sp>
+          <p:sp>
+            <p:nvSpPr>
+              <p:cNvPr id="31" name="TextBox 30">
+                <a:extLst>
+                  <a:ext uri="{FF2B5EF4-FFF2-40B4-BE49-F238E27FC236}">
+                    <a16:creationId xmlns:a16="http://schemas.microsoft.com/office/drawing/2014/main" id="{98C9476E-994E-CB82-D10F-4BAD13D5D2FD}"/>
+                  </a:ext>
+                </a:extLst>
+              </p:cNvPr>
+              <p:cNvSpPr txBox="1"/>
+              <p:nvPr/>
+            </p:nvSpPr>
+            <p:spPr>
+              <a:xfrm>
+                <a:off x="5456905" y="2998771"/>
+                <a:ext cx="645073" cy="230832"/>
+              </a:xfrm>
+              <a:prstGeom prst="rect">
+                <a:avLst/>
+              </a:prstGeom>
+              <a:noFill/>
+            </p:spPr>
+            <p:txBody>
+              <a:bodyPr wrap="square" rtlCol="0">
+                <a:spAutoFit/>
+              </a:bodyPr>
+              <a:lstStyle/>
+              <a:p>
+                <a:pPr algn="ctr"/>
+                <a:r>
+                  <a:rPr lang="en-US" altLang="ko-KR" sz="900" b="1" dirty="0"/>
+                  <a:t>Port.in</a:t>
+                </a:r>
+                <a:endParaRPr lang="ko-KR" altLang="en-US" sz="1400" b="1" dirty="0"/>
+              </a:p>
+            </p:txBody>
+          </p:sp>
+          <p:sp>
+            <p:nvSpPr>
+              <p:cNvPr id="32" name="TextBox 31">
+                <a:extLst>
+                  <a:ext uri="{FF2B5EF4-FFF2-40B4-BE49-F238E27FC236}">
+                    <a16:creationId xmlns:a16="http://schemas.microsoft.com/office/drawing/2014/main" id="{F9AB93E4-6744-CDAD-C892-247447BF2480}"/>
+                  </a:ext>
+                </a:extLst>
+              </p:cNvPr>
+              <p:cNvSpPr txBox="1"/>
+              <p:nvPr/>
+            </p:nvSpPr>
+            <p:spPr>
+              <a:xfrm>
+                <a:off x="6938638" y="2995313"/>
+                <a:ext cx="645073" cy="230832"/>
+              </a:xfrm>
+              <a:prstGeom prst="rect">
+                <a:avLst/>
+              </a:prstGeom>
+              <a:noFill/>
+            </p:spPr>
+            <p:txBody>
+              <a:bodyPr wrap="square" rtlCol="0">
+                <a:spAutoFit/>
+              </a:bodyPr>
+              <a:lstStyle/>
+              <a:p>
+                <a:pPr algn="ctr"/>
+                <a:r>
+                  <a:rPr lang="en-US" altLang="ko-KR" sz="900" b="1" dirty="0" err="1"/>
+                  <a:t>Port.out</a:t>
+                </a:r>
+                <a:endParaRPr lang="ko-KR" altLang="en-US" sz="1400" b="1" dirty="0"/>
+              </a:p>
+            </p:txBody>
+          </p:sp>
+          <p:sp>
+            <p:nvSpPr>
+              <p:cNvPr id="33" name="TextBox 32">
+                <a:extLst>
+                  <a:ext uri="{FF2B5EF4-FFF2-40B4-BE49-F238E27FC236}">
+                    <a16:creationId xmlns:a16="http://schemas.microsoft.com/office/drawing/2014/main" id="{E1AD27FF-1616-5EAB-6465-09FB52E6723A}"/>
+                  </a:ext>
+                </a:extLst>
+              </p:cNvPr>
+              <p:cNvSpPr txBox="1"/>
+              <p:nvPr/>
+            </p:nvSpPr>
+            <p:spPr>
+              <a:xfrm>
+                <a:off x="4920301" y="2776961"/>
+                <a:ext cx="992777" cy="230832"/>
+              </a:xfrm>
+              <a:prstGeom prst="rect">
+                <a:avLst/>
+              </a:prstGeom>
+              <a:noFill/>
+            </p:spPr>
+            <p:txBody>
+              <a:bodyPr wrap="square" rtlCol="0">
+                <a:spAutoFit/>
+              </a:bodyPr>
+              <a:lstStyle/>
+              <a:p>
+                <a:pPr algn="ctr"/>
+                <a:r>
+                  <a:rPr lang="en-US" altLang="ko-KR" sz="900" b="1" dirty="0"/>
+                  <a:t>Adapter</a:t>
+                </a:r>
+                <a:endParaRPr lang="ko-KR" altLang="en-US" sz="1400" b="1" dirty="0"/>
+              </a:p>
+            </p:txBody>
+          </p:sp>
+          <p:sp>
+            <p:nvSpPr>
+              <p:cNvPr id="34" name="TextBox 33">
+                <a:extLst>
+                  <a:ext uri="{FF2B5EF4-FFF2-40B4-BE49-F238E27FC236}">
+                    <a16:creationId xmlns:a16="http://schemas.microsoft.com/office/drawing/2014/main" id="{3D3C9B94-5874-A3E3-922D-A8B718C78D8E}"/>
+                  </a:ext>
+                </a:extLst>
+              </p:cNvPr>
+              <p:cNvSpPr txBox="1"/>
+              <p:nvPr/>
+            </p:nvSpPr>
+            <p:spPr>
+              <a:xfrm>
+                <a:off x="5167910" y="2981556"/>
+                <a:ext cx="390067" cy="230832"/>
+              </a:xfrm>
+              <a:prstGeom prst="rect">
+                <a:avLst/>
+              </a:prstGeom>
+              <a:noFill/>
+            </p:spPr>
+            <p:txBody>
+              <a:bodyPr wrap="square" rtlCol="0">
+                <a:spAutoFit/>
+              </a:bodyPr>
+              <a:lstStyle/>
+              <a:p>
+                <a:pPr algn="ctr"/>
+                <a:r>
+                  <a:rPr lang="en-US" altLang="ko-KR" sz="900" b="1" dirty="0"/>
+                  <a:t>in</a:t>
+                </a:r>
+                <a:endParaRPr lang="ko-KR" altLang="en-US" sz="1400" b="1" dirty="0"/>
+              </a:p>
+            </p:txBody>
+          </p:sp>
+          <p:sp>
+            <p:nvSpPr>
+              <p:cNvPr id="35" name="TextBox 34">
+                <a:extLst>
+                  <a:ext uri="{FF2B5EF4-FFF2-40B4-BE49-F238E27FC236}">
+                    <a16:creationId xmlns:a16="http://schemas.microsoft.com/office/drawing/2014/main" id="{931A1BD5-0BF9-3F17-A735-B2A1E68A3D36}"/>
+                  </a:ext>
+                </a:extLst>
+              </p:cNvPr>
+              <p:cNvSpPr txBox="1"/>
+              <p:nvPr/>
+            </p:nvSpPr>
+            <p:spPr>
+              <a:xfrm>
+                <a:off x="7552454" y="2981556"/>
+                <a:ext cx="410894" cy="230832"/>
+              </a:xfrm>
+              <a:prstGeom prst="rect">
+                <a:avLst/>
+              </a:prstGeom>
+              <a:noFill/>
+            </p:spPr>
+            <p:txBody>
+              <a:bodyPr wrap="square" rtlCol="0">
+                <a:spAutoFit/>
+              </a:bodyPr>
+              <a:lstStyle/>
+              <a:p>
+                <a:pPr algn="ctr"/>
+                <a:r>
+                  <a:rPr lang="en-US" altLang="ko-KR" sz="900" b="1" dirty="0"/>
+                  <a:t>out</a:t>
+                </a:r>
+                <a:endParaRPr lang="ko-KR" altLang="en-US" sz="1400" b="1" dirty="0"/>
+              </a:p>
+            </p:txBody>
+          </p:sp>
+          <p:sp>
+            <p:nvSpPr>
+              <p:cNvPr id="36" name="직사각형 35">
+                <a:extLst>
+                  <a:ext uri="{FF2B5EF4-FFF2-40B4-BE49-F238E27FC236}">
+                    <a16:creationId xmlns:a16="http://schemas.microsoft.com/office/drawing/2014/main" id="{122B1229-341F-8F41-CD62-CFAF23419D30}"/>
+                  </a:ext>
+                </a:extLst>
+              </p:cNvPr>
+              <p:cNvSpPr/>
+              <p:nvPr/>
+            </p:nvSpPr>
+            <p:spPr>
+              <a:xfrm>
+                <a:off x="5497413" y="3408503"/>
+                <a:ext cx="1463430" cy="147820"/>
+              </a:xfrm>
+              <a:prstGeom prst="rect">
+                <a:avLst/>
+              </a:prstGeom>
+              <a:noFill/>
+              <a:ln>
+                <a:noFill/>
+              </a:ln>
+            </p:spPr>
+            <p:style>
+              <a:lnRef idx="2">
+                <a:schemeClr val="accent1">
+                  <a:shade val="15000"/>
+                </a:schemeClr>
+              </a:lnRef>
+              <a:fillRef idx="1">
+                <a:schemeClr val="accent1"/>
+              </a:fillRef>
+              <a:effectRef idx="0">
+                <a:schemeClr val="accent1"/>
+              </a:effectRef>
+              <a:fontRef idx="minor">
+                <a:schemeClr val="lt1"/>
+              </a:fontRef>
+            </p:style>
+            <p:txBody>
+              <a:bodyPr rtlCol="0" anchor="ctr"/>
+              <a:lstStyle/>
+              <a:p>
+                <a:pPr algn="ctr"/>
+                <a:r>
+                  <a:rPr lang="en-US" altLang="ko-KR" sz="800" dirty="0" err="1">
+                    <a:solidFill>
+                      <a:schemeClr val="tx1">
+                        <a:lumMod val="65000"/>
+                        <a:lumOff val="35000"/>
+                      </a:schemeClr>
+                    </a:solidFill>
+                  </a:rPr>
+                  <a:t>Usecase</a:t>
+                </a:r>
+                <a:r>
+                  <a:rPr lang="en-US" altLang="ko-KR" sz="800" dirty="0"/>
+                  <a:t> -&gt; </a:t>
+                </a:r>
+                <a:r>
+                  <a:rPr lang="en-US" altLang="ko-KR" sz="800" dirty="0">
+                    <a:solidFill>
+                      <a:schemeClr val="bg1">
+                        <a:lumMod val="85000"/>
+                      </a:schemeClr>
+                    </a:solidFill>
+                  </a:rPr>
+                  <a:t>service </a:t>
+                </a:r>
+                <a:r>
+                  <a:rPr lang="ko-KR" altLang="en-US" sz="800" dirty="0">
+                    <a:solidFill>
+                      <a:schemeClr val="bg1">
+                        <a:lumMod val="85000"/>
+                      </a:schemeClr>
+                    </a:solidFill>
+                  </a:rPr>
+                  <a:t>구현체</a:t>
+                </a:r>
+              </a:p>
+            </p:txBody>
+          </p:sp>
+          <p:sp>
+            <p:nvSpPr>
+              <p:cNvPr id="37" name="직사각형 36">
+                <a:extLst>
+                  <a:ext uri="{FF2B5EF4-FFF2-40B4-BE49-F238E27FC236}">
+                    <a16:creationId xmlns:a16="http://schemas.microsoft.com/office/drawing/2014/main" id="{CD93D17F-0069-98F6-2921-E7EDC67CF62B}"/>
+                  </a:ext>
+                </a:extLst>
+              </p:cNvPr>
+              <p:cNvSpPr/>
+              <p:nvPr/>
+            </p:nvSpPr>
+            <p:spPr>
+              <a:xfrm>
+                <a:off x="7074764" y="3263536"/>
+                <a:ext cx="1007314" cy="348186"/>
+              </a:xfrm>
+              <a:prstGeom prst="rect">
+                <a:avLst/>
+              </a:prstGeom>
+              <a:noFill/>
+              <a:ln>
+                <a:noFill/>
+              </a:ln>
+            </p:spPr>
+            <p:style>
+              <a:lnRef idx="2">
+                <a:schemeClr val="accent1">
+                  <a:shade val="15000"/>
+                </a:schemeClr>
+              </a:lnRef>
+              <a:fillRef idx="1">
+                <a:schemeClr val="accent1"/>
+              </a:fillRef>
+              <a:effectRef idx="0">
+                <a:schemeClr val="accent1"/>
+              </a:effectRef>
+              <a:fontRef idx="minor">
+                <a:schemeClr val="lt1"/>
+              </a:fontRef>
+            </p:style>
+            <p:txBody>
+              <a:bodyPr rtlCol="0" anchor="ctr"/>
+              <a:lstStyle/>
+              <a:p>
+                <a:pPr algn="ctr"/>
+                <a:r>
+                  <a:rPr lang="en-US" altLang="ko-KR" sz="800" dirty="0">
+                    <a:solidFill>
+                      <a:schemeClr val="tx1">
+                        <a:lumMod val="65000"/>
+                        <a:lumOff val="35000"/>
+                      </a:schemeClr>
+                    </a:solidFill>
+                  </a:rPr>
+                  <a:t>            Adapter Port -&gt;</a:t>
+                </a:r>
+                <a:r>
+                  <a:rPr lang="ko-KR" altLang="en-US" sz="800" dirty="0">
+                    <a:solidFill>
+                      <a:schemeClr val="tx1">
+                        <a:lumMod val="65000"/>
+                        <a:lumOff val="35000"/>
+                      </a:schemeClr>
+                    </a:solidFill>
+                  </a:rPr>
+                  <a:t>구현체  </a:t>
+                </a:r>
+              </a:p>
+            </p:txBody>
+          </p:sp>
+          <p:cxnSp>
+            <p:nvCxnSpPr>
+              <p:cNvPr id="39" name="직선 화살표 연결선 38">
+                <a:extLst>
+                  <a:ext uri="{FF2B5EF4-FFF2-40B4-BE49-F238E27FC236}">
+                    <a16:creationId xmlns:a16="http://schemas.microsoft.com/office/drawing/2014/main" id="{9C5EE85C-0A30-734F-3552-3EE38BA404F1}"/>
+                  </a:ext>
+                </a:extLst>
+              </p:cNvPr>
+              <p:cNvCxnSpPr/>
+              <p:nvPr/>
+            </p:nvCxnSpPr>
+            <p:spPr>
+              <a:xfrm>
+                <a:off x="4633686" y="3212388"/>
+                <a:ext cx="281858" cy="0"/>
+              </a:xfrm>
+              <a:prstGeom prst="straightConnector1">
+                <a:avLst/>
+              </a:prstGeom>
+              <a:ln w="19050">
+                <a:solidFill>
+                  <a:schemeClr val="bg1">
+                    <a:lumMod val="50000"/>
+                  </a:schemeClr>
+                </a:solidFill>
+                <a:tailEnd type="triangle" w="sm" len="med"/>
+              </a:ln>
+            </p:spPr>
+            <p:style>
+              <a:lnRef idx="1">
+                <a:schemeClr val="accent1"/>
+              </a:lnRef>
+              <a:fillRef idx="0">
+                <a:schemeClr val="accent1"/>
+              </a:fillRef>
+              <a:effectRef idx="0">
+                <a:schemeClr val="accent1"/>
+              </a:effectRef>
+              <a:fontRef idx="minor">
+                <a:schemeClr val="tx1"/>
+              </a:fontRef>
+            </p:style>
+          </p:cxnSp>
+          <p:cxnSp>
+            <p:nvCxnSpPr>
+              <p:cNvPr id="40" name="직선 화살표 연결선 39">
+                <a:extLst>
+                  <a:ext uri="{FF2B5EF4-FFF2-40B4-BE49-F238E27FC236}">
+                    <a16:creationId xmlns:a16="http://schemas.microsoft.com/office/drawing/2014/main" id="{5DE9B564-E41A-842F-7215-3CE3032484ED}"/>
+                  </a:ext>
+                </a:extLst>
+              </p:cNvPr>
+              <p:cNvCxnSpPr>
+                <a:cxnSpLocks/>
+              </p:cNvCxnSpPr>
+              <p:nvPr/>
+            </p:nvCxnSpPr>
+            <p:spPr>
+              <a:xfrm rot="10800000">
+                <a:off x="4633686" y="3321417"/>
+                <a:ext cx="281858" cy="0"/>
+              </a:xfrm>
+              <a:prstGeom prst="straightConnector1">
+                <a:avLst/>
+              </a:prstGeom>
+              <a:ln w="19050">
+                <a:solidFill>
+                  <a:schemeClr val="bg1">
+                    <a:lumMod val="50000"/>
+                  </a:schemeClr>
+                </a:solidFill>
+                <a:tailEnd type="triangle" w="sm" len="med"/>
+              </a:ln>
+            </p:spPr>
+            <p:style>
+              <a:lnRef idx="1">
+                <a:schemeClr val="accent1"/>
+              </a:lnRef>
+              <a:fillRef idx="0">
+                <a:schemeClr val="accent1"/>
+              </a:fillRef>
+              <a:effectRef idx="0">
+                <a:schemeClr val="accent1"/>
+              </a:effectRef>
+              <a:fontRef idx="minor">
+                <a:schemeClr val="tx1"/>
+              </a:fontRef>
+            </p:style>
+          </p:cxnSp>
+          <p:cxnSp>
+            <p:nvCxnSpPr>
+              <p:cNvPr id="41" name="직선 화살표 연결선 40">
+                <a:extLst>
+                  <a:ext uri="{FF2B5EF4-FFF2-40B4-BE49-F238E27FC236}">
+                    <a16:creationId xmlns:a16="http://schemas.microsoft.com/office/drawing/2014/main" id="{CFAD4343-228E-325F-4060-3DAA5A4F3895}"/>
+                  </a:ext>
+                </a:extLst>
+              </p:cNvPr>
+              <p:cNvCxnSpPr/>
+              <p:nvPr/>
+            </p:nvCxnSpPr>
+            <p:spPr>
+              <a:xfrm>
+                <a:off x="8112216" y="3248862"/>
+                <a:ext cx="281858" cy="0"/>
+              </a:xfrm>
+              <a:prstGeom prst="straightConnector1">
+                <a:avLst/>
+              </a:prstGeom>
+              <a:ln w="19050">
+                <a:solidFill>
+                  <a:schemeClr val="bg1">
+                    <a:lumMod val="50000"/>
+                  </a:schemeClr>
+                </a:solidFill>
+                <a:tailEnd type="triangle" w="sm" len="med"/>
+              </a:ln>
+            </p:spPr>
+            <p:style>
+              <a:lnRef idx="1">
+                <a:schemeClr val="accent1"/>
+              </a:lnRef>
+              <a:fillRef idx="0">
+                <a:schemeClr val="accent1"/>
+              </a:fillRef>
+              <a:effectRef idx="0">
+                <a:schemeClr val="accent1"/>
+              </a:effectRef>
+              <a:fontRef idx="minor">
+                <a:schemeClr val="tx1"/>
+              </a:fontRef>
+            </p:style>
+          </p:cxnSp>
+          <p:cxnSp>
+            <p:nvCxnSpPr>
+              <p:cNvPr id="42" name="직선 화살표 연결선 41">
+                <a:extLst>
+                  <a:ext uri="{FF2B5EF4-FFF2-40B4-BE49-F238E27FC236}">
+                    <a16:creationId xmlns:a16="http://schemas.microsoft.com/office/drawing/2014/main" id="{1EFED411-A597-6134-7ED5-41E142B097E0}"/>
+                  </a:ext>
+                </a:extLst>
+              </p:cNvPr>
+              <p:cNvCxnSpPr>
+                <a:cxnSpLocks/>
+              </p:cNvCxnSpPr>
+              <p:nvPr/>
+            </p:nvCxnSpPr>
+            <p:spPr>
+              <a:xfrm rot="10800000">
+                <a:off x="8112216" y="3357891"/>
+                <a:ext cx="281858" cy="0"/>
+              </a:xfrm>
+              <a:prstGeom prst="straightConnector1">
+                <a:avLst/>
+              </a:prstGeom>
+              <a:ln w="19050">
+                <a:solidFill>
+                  <a:schemeClr val="bg1">
+                    <a:lumMod val="50000"/>
+                  </a:schemeClr>
+                </a:solidFill>
+                <a:tailEnd type="triangle" w="sm" len="med"/>
+              </a:ln>
+            </p:spPr>
+            <p:style>
+              <a:lnRef idx="1">
+                <a:schemeClr val="accent1"/>
+              </a:lnRef>
+              <a:fillRef idx="0">
+                <a:schemeClr val="accent1"/>
+              </a:fillRef>
+              <a:effectRef idx="0">
+                <a:schemeClr val="accent1"/>
+              </a:effectRef>
+              <a:fontRef idx="minor">
+                <a:schemeClr val="tx1"/>
+              </a:fontRef>
+            </p:style>
+          </p:cxnSp>
+        </p:grpSp>
+        <p:sp>
+          <p:nvSpPr>
+            <p:cNvPr id="44" name="직사각형 43">
+              <a:extLst>
+                <a:ext uri="{FF2B5EF4-FFF2-40B4-BE49-F238E27FC236}">
+                  <a16:creationId xmlns:a16="http://schemas.microsoft.com/office/drawing/2014/main" id="{7E804C53-CD48-33D8-E141-E931F20A337F}"/>
+                </a:ext>
+              </a:extLst>
+            </p:cNvPr>
+            <p:cNvSpPr/>
+            <p:nvPr/>
+          </p:nvSpPr>
+          <p:spPr>
+            <a:xfrm>
+              <a:off x="8335822" y="884090"/>
+              <a:ext cx="666933" cy="135131"/>
+            </a:xfrm>
+            <a:prstGeom prst="rect">
+              <a:avLst/>
+            </a:prstGeom>
+            <a:noFill/>
+            <a:ln>
+              <a:noFill/>
+            </a:ln>
+          </p:spPr>
+          <p:style>
+            <a:lnRef idx="2">
+              <a:schemeClr val="accent1">
+                <a:shade val="15000"/>
+              </a:schemeClr>
+            </a:lnRef>
+            <a:fillRef idx="1">
+              <a:schemeClr val="accent1"/>
+            </a:fillRef>
+            <a:effectRef idx="0">
+              <a:schemeClr val="accent1"/>
+            </a:effectRef>
+            <a:fontRef idx="minor">
+              <a:schemeClr val="lt1"/>
+            </a:fontRef>
+          </p:style>
+          <p:txBody>
+            <a:bodyPr rtlCol="0" anchor="ctr"/>
+            <a:lstStyle/>
+            <a:p>
+              <a:pPr algn="ctr"/>
+              <a:r>
+                <a:rPr lang="en-US" altLang="ko-KR" sz="800" dirty="0">
+                  <a:solidFill>
+                    <a:schemeClr val="tx1">
+                      <a:lumMod val="65000"/>
+                      <a:lumOff val="35000"/>
+                    </a:schemeClr>
+                  </a:solidFill>
+                </a:rPr>
+                <a:t>controller</a:t>
+              </a:r>
+              <a:endParaRPr lang="ko-KR" altLang="en-US" sz="800" dirty="0">
+                <a:solidFill>
+                  <a:schemeClr val="bg1">
+                    <a:lumMod val="85000"/>
+                  </a:schemeClr>
+                </a:solidFill>
+              </a:endParaRPr>
+            </a:p>
+          </p:txBody>
+        </p:sp>
+      </p:grpSp>
+      <p:grpSp>
+        <p:nvGrpSpPr>
+          <p:cNvPr id="15" name="그룹 14">
+            <a:extLst>
+              <a:ext uri="{FF2B5EF4-FFF2-40B4-BE49-F238E27FC236}">
+                <a16:creationId xmlns:a16="http://schemas.microsoft.com/office/drawing/2014/main" id="{A00A0F37-37BD-0140-266F-180FFA3DF6DD}"/>
+              </a:ext>
+            </a:extLst>
+          </p:cNvPr>
+          <p:cNvGrpSpPr/>
+          <p:nvPr/>
+        </p:nvGrpSpPr>
+        <p:grpSpPr>
+          <a:xfrm>
+            <a:off x="4925356" y="1476265"/>
+            <a:ext cx="3403400" cy="1884054"/>
+            <a:chOff x="4925356" y="1476265"/>
+            <a:chExt cx="3403400" cy="1884054"/>
+          </a:xfrm>
+        </p:grpSpPr>
+        <p:grpSp>
+          <p:nvGrpSpPr>
+            <p:cNvPr id="14" name="그룹 13">
+              <a:extLst>
+                <a:ext uri="{FF2B5EF4-FFF2-40B4-BE49-F238E27FC236}">
+                  <a16:creationId xmlns:a16="http://schemas.microsoft.com/office/drawing/2014/main" id="{97E5E9A4-511A-DE44-6EE7-B89419450560}"/>
+                </a:ext>
+              </a:extLst>
+            </p:cNvPr>
+            <p:cNvGrpSpPr/>
+            <p:nvPr/>
+          </p:nvGrpSpPr>
+          <p:grpSpPr>
+            <a:xfrm rot="10978648">
+              <a:off x="5870139" y="1776033"/>
+              <a:ext cx="871835" cy="1584286"/>
+              <a:chOff x="2833225" y="2195403"/>
+              <a:chExt cx="871835" cy="1584286"/>
+            </a:xfrm>
+          </p:grpSpPr>
+          <p:sp>
+            <p:nvSpPr>
+              <p:cNvPr id="9" name="육각형 8">
+                <a:extLst>
+                  <a:ext uri="{FF2B5EF4-FFF2-40B4-BE49-F238E27FC236}">
+                    <a16:creationId xmlns:a16="http://schemas.microsoft.com/office/drawing/2014/main" id="{797C9D4B-7E49-1468-583D-7FAFFF3E0CA6}"/>
+                  </a:ext>
+                </a:extLst>
+              </p:cNvPr>
+              <p:cNvSpPr/>
+              <p:nvPr/>
+            </p:nvSpPr>
+            <p:spPr>
+              <a:xfrm rot="7140000">
+                <a:off x="2534829" y="2812522"/>
+                <a:ext cx="1352609" cy="558725"/>
+              </a:xfrm>
+              <a:prstGeom prst="hexagon">
+                <a:avLst/>
+              </a:prstGeom>
+              <a:solidFill>
+                <a:schemeClr val="accent2">
+                  <a:lumMod val="20000"/>
+                  <a:lumOff val="80000"/>
+                </a:schemeClr>
+              </a:solidFill>
+              <a:ln>
+                <a:noFill/>
+              </a:ln>
+            </p:spPr>
+            <p:style>
+              <a:lnRef idx="2">
+                <a:schemeClr val="accent1">
+                  <a:shade val="15000"/>
+                </a:schemeClr>
+              </a:lnRef>
+              <a:fillRef idx="1">
+                <a:schemeClr val="accent1"/>
+              </a:fillRef>
+              <a:effectRef idx="0">
+                <a:schemeClr val="accent1"/>
+              </a:effectRef>
+              <a:fontRef idx="minor">
+                <a:schemeClr val="lt1"/>
+              </a:fontRef>
+            </p:style>
+            <p:txBody>
+              <a:bodyPr rtlCol="0" anchor="ctr"/>
+              <a:lstStyle/>
+              <a:p>
+                <a:pPr algn="ctr"/>
+                <a:endParaRPr lang="ko-KR" altLang="en-US"/>
+              </a:p>
+            </p:txBody>
+          </p:sp>
+          <p:sp>
+            <p:nvSpPr>
+              <p:cNvPr id="10" name="육각형 9">
+                <a:extLst>
+                  <a:ext uri="{FF2B5EF4-FFF2-40B4-BE49-F238E27FC236}">
+                    <a16:creationId xmlns:a16="http://schemas.microsoft.com/office/drawing/2014/main" id="{93C49496-05A1-43FE-EA90-1BAD6A128A74}"/>
+                  </a:ext>
+                </a:extLst>
+              </p:cNvPr>
+              <p:cNvSpPr/>
+              <p:nvPr/>
+            </p:nvSpPr>
+            <p:spPr>
+              <a:xfrm rot="7140000">
+                <a:off x="2603304" y="2989877"/>
+                <a:ext cx="1019733" cy="559892"/>
+              </a:xfrm>
+              <a:prstGeom prst="hexagon">
+                <a:avLst/>
+              </a:prstGeom>
+              <a:solidFill>
+                <a:schemeClr val="accent5">
+                  <a:lumMod val="40000"/>
+                  <a:lumOff val="60000"/>
+                </a:schemeClr>
+              </a:solidFill>
+              <a:ln>
+                <a:noFill/>
+              </a:ln>
+            </p:spPr>
+            <p:style>
+              <a:lnRef idx="2">
+                <a:schemeClr val="accent1">
+                  <a:shade val="15000"/>
+                </a:schemeClr>
+              </a:lnRef>
+              <a:fillRef idx="1">
+                <a:schemeClr val="accent1"/>
+              </a:fillRef>
+              <a:effectRef idx="0">
+                <a:schemeClr val="accent1"/>
+              </a:effectRef>
+              <a:fontRef idx="minor">
+                <a:schemeClr val="lt1"/>
+              </a:fontRef>
+            </p:style>
+            <p:txBody>
+              <a:bodyPr rtlCol="0" anchor="ctr"/>
+              <a:lstStyle/>
+              <a:p>
+                <a:pPr algn="ctr"/>
+                <a:endParaRPr lang="ko-KR" altLang="en-US"/>
+              </a:p>
+            </p:txBody>
+          </p:sp>
+          <p:cxnSp>
+            <p:nvCxnSpPr>
+              <p:cNvPr id="11" name="직선 화살표 연결선 10">
+                <a:extLst>
+                  <a:ext uri="{FF2B5EF4-FFF2-40B4-BE49-F238E27FC236}">
+                    <a16:creationId xmlns:a16="http://schemas.microsoft.com/office/drawing/2014/main" id="{2B78FB94-FA7C-E02A-990E-8B4FB7B56222}"/>
+                  </a:ext>
+                </a:extLst>
+              </p:cNvPr>
+              <p:cNvCxnSpPr/>
+              <p:nvPr/>
+            </p:nvCxnSpPr>
+            <p:spPr>
+              <a:xfrm rot="7140000">
+                <a:off x="3564131" y="2389191"/>
+                <a:ext cx="281858" cy="0"/>
+              </a:xfrm>
+              <a:prstGeom prst="straightConnector1">
+                <a:avLst/>
+              </a:prstGeom>
+              <a:ln w="19050">
+                <a:solidFill>
+                  <a:schemeClr val="bg1">
+                    <a:lumMod val="50000"/>
+                  </a:schemeClr>
+                </a:solidFill>
+                <a:tailEnd type="triangle" w="sm" len="med"/>
+              </a:ln>
+            </p:spPr>
+            <p:style>
+              <a:lnRef idx="1">
+                <a:schemeClr val="accent1"/>
+              </a:lnRef>
+              <a:fillRef idx="0">
+                <a:schemeClr val="accent1"/>
+              </a:fillRef>
+              <a:effectRef idx="0">
+                <a:schemeClr val="accent1"/>
+              </a:effectRef>
+              <a:fontRef idx="minor">
+                <a:schemeClr val="tx1"/>
+              </a:fontRef>
+            </p:style>
+          </p:cxnSp>
+          <p:cxnSp>
+            <p:nvCxnSpPr>
+              <p:cNvPr id="12" name="직선 화살표 연결선 11">
+                <a:extLst>
+                  <a:ext uri="{FF2B5EF4-FFF2-40B4-BE49-F238E27FC236}">
+                    <a16:creationId xmlns:a16="http://schemas.microsoft.com/office/drawing/2014/main" id="{8C3106E6-153F-4539-EE67-BFFC0A7C371A}"/>
+                  </a:ext>
+                </a:extLst>
+              </p:cNvPr>
+              <p:cNvCxnSpPr>
+                <a:cxnSpLocks/>
+              </p:cNvCxnSpPr>
+              <p:nvPr/>
+            </p:nvCxnSpPr>
+            <p:spPr>
+              <a:xfrm rot="17940000">
+                <a:off x="3468770" y="2336332"/>
+                <a:ext cx="281858" cy="0"/>
+              </a:xfrm>
+              <a:prstGeom prst="straightConnector1">
+                <a:avLst/>
+              </a:prstGeom>
+              <a:ln w="19050">
+                <a:solidFill>
+                  <a:schemeClr val="bg1">
+                    <a:lumMod val="50000"/>
+                  </a:schemeClr>
+                </a:solidFill>
+                <a:tailEnd type="triangle" w="sm" len="med"/>
+              </a:ln>
+            </p:spPr>
+            <p:style>
+              <a:lnRef idx="1">
+                <a:schemeClr val="accent1"/>
+              </a:lnRef>
+              <a:fillRef idx="0">
+                <a:schemeClr val="accent1"/>
+              </a:fillRef>
+              <a:effectRef idx="0">
+                <a:schemeClr val="accent1"/>
+              </a:effectRef>
+              <a:fontRef idx="minor">
+                <a:schemeClr val="tx1"/>
+              </a:fontRef>
+            </p:style>
+          </p:cxnSp>
+          <p:sp>
+            <p:nvSpPr>
+              <p:cNvPr id="13" name="TextBox 12">
+                <a:extLst>
+                  <a:ext uri="{FF2B5EF4-FFF2-40B4-BE49-F238E27FC236}">
+                    <a16:creationId xmlns:a16="http://schemas.microsoft.com/office/drawing/2014/main" id="{B06E59AA-9A91-A322-932B-1E3DCD7FD377}"/>
+                  </a:ext>
+                </a:extLst>
+              </p:cNvPr>
+              <p:cNvSpPr txBox="1"/>
+              <p:nvPr/>
+            </p:nvSpPr>
+            <p:spPr>
+              <a:xfrm rot="7039577">
+                <a:off x="2933447" y="2578814"/>
+                <a:ext cx="835479" cy="461665"/>
+              </a:xfrm>
+              <a:prstGeom prst="rect">
+                <a:avLst/>
+              </a:prstGeom>
+              <a:noFill/>
+            </p:spPr>
+            <p:txBody>
+              <a:bodyPr wrap="square" rtlCol="0">
+                <a:spAutoFit/>
+              </a:bodyPr>
+              <a:lstStyle/>
+              <a:p>
+                <a:pPr algn="ctr"/>
+                <a:r>
+                  <a:rPr lang="en-US" altLang="ko-KR" sz="800" dirty="0" err="1"/>
+                  <a:t>Memership</a:t>
+                </a:r>
+                <a:r>
+                  <a:rPr lang="ko-KR" altLang="en-US" sz="800" dirty="0"/>
+                  <a:t> </a:t>
+                </a:r>
+                <a:endParaRPr lang="en-US" altLang="ko-KR" sz="800" dirty="0"/>
+              </a:p>
+              <a:p>
+                <a:pPr algn="ctr"/>
+                <a:r>
+                  <a:rPr lang="ko-KR" altLang="en-US" sz="800" dirty="0"/>
+                  <a:t>회원 정보 </a:t>
+                </a:r>
+                <a:endParaRPr lang="en-US" altLang="ko-KR" sz="800" dirty="0"/>
+              </a:p>
+              <a:p>
+                <a:pPr algn="ctr"/>
+                <a:r>
+                  <a:rPr lang="ko-KR" altLang="en-US" sz="800" dirty="0"/>
+                  <a:t>확인 요청</a:t>
+                </a:r>
+              </a:p>
+            </p:txBody>
+          </p:sp>
+        </p:grpSp>
+        <p:grpSp>
+          <p:nvGrpSpPr>
+            <p:cNvPr id="53" name="그룹 52">
+              <a:extLst>
+                <a:ext uri="{FF2B5EF4-FFF2-40B4-BE49-F238E27FC236}">
+                  <a16:creationId xmlns:a16="http://schemas.microsoft.com/office/drawing/2014/main" id="{44B73409-4B04-6B26-55E3-5AB19862CB09}"/>
+                </a:ext>
+              </a:extLst>
+            </p:cNvPr>
+            <p:cNvGrpSpPr/>
+            <p:nvPr/>
+          </p:nvGrpSpPr>
+          <p:grpSpPr>
+            <a:xfrm>
+              <a:off x="4925356" y="1476265"/>
+              <a:ext cx="3403400" cy="990205"/>
+              <a:chOff x="4625634" y="2779868"/>
+              <a:chExt cx="3403400" cy="990205"/>
+            </a:xfrm>
+          </p:grpSpPr>
+          <p:grpSp>
+            <p:nvGrpSpPr>
+              <p:cNvPr id="20" name="그룹 19">
+                <a:extLst>
+                  <a:ext uri="{FF2B5EF4-FFF2-40B4-BE49-F238E27FC236}">
+                    <a16:creationId xmlns:a16="http://schemas.microsoft.com/office/drawing/2014/main" id="{01EE5083-0392-E949-F299-C5074A288397}"/>
+                  </a:ext>
+                </a:extLst>
+              </p:cNvPr>
+              <p:cNvGrpSpPr/>
+              <p:nvPr/>
+            </p:nvGrpSpPr>
+            <p:grpSpPr>
+              <a:xfrm>
+                <a:off x="5149261" y="2779868"/>
+                <a:ext cx="2394527" cy="990205"/>
+                <a:chOff x="4854258" y="3573572"/>
+                <a:chExt cx="2394527" cy="990205"/>
+              </a:xfrm>
+            </p:grpSpPr>
+            <p:sp>
+              <p:nvSpPr>
+                <p:cNvPr id="17" name="육각형 16">
+                  <a:extLst>
+                    <a:ext uri="{FF2B5EF4-FFF2-40B4-BE49-F238E27FC236}">
+                      <a16:creationId xmlns:a16="http://schemas.microsoft.com/office/drawing/2014/main" id="{2CCF36EC-CBE9-9F07-83FC-A3D1EF37E68F}"/>
+                    </a:ext>
+                  </a:extLst>
+                </p:cNvPr>
+                <p:cNvSpPr/>
+                <p:nvPr/>
+              </p:nvSpPr>
+              <p:spPr>
+                <a:xfrm>
+                  <a:off x="4854258" y="3793746"/>
+                  <a:ext cx="2394527" cy="558725"/>
+                </a:xfrm>
+                <a:prstGeom prst="hexagon">
+                  <a:avLst/>
+                </a:prstGeom>
+                <a:solidFill>
+                  <a:schemeClr val="accent2">
+                    <a:lumMod val="20000"/>
+                    <a:lumOff val="80000"/>
+                  </a:schemeClr>
+                </a:solidFill>
+                <a:ln>
+                  <a:noFill/>
+                </a:ln>
+              </p:spPr>
+              <p:style>
+                <a:lnRef idx="2">
+                  <a:schemeClr val="accent1">
+                    <a:shade val="15000"/>
+                  </a:schemeClr>
+                </a:lnRef>
+                <a:fillRef idx="1">
+                  <a:schemeClr val="accent1"/>
+                </a:fillRef>
+                <a:effectRef idx="0">
+                  <a:schemeClr val="accent1"/>
+                </a:effectRef>
+                <a:fontRef idx="minor">
+                  <a:schemeClr val="lt1"/>
+                </a:fontRef>
+              </p:style>
+              <p:txBody>
+                <a:bodyPr rtlCol="0" anchor="ctr"/>
+                <a:lstStyle/>
+                <a:p>
+                  <a:pPr algn="ctr"/>
+                  <a:endParaRPr lang="ko-KR" altLang="en-US"/>
+                </a:p>
+              </p:txBody>
+            </p:sp>
+            <p:sp>
+              <p:nvSpPr>
+                <p:cNvPr id="18" name="육각형 17">
+                  <a:extLst>
+                    <a:ext uri="{FF2B5EF4-FFF2-40B4-BE49-F238E27FC236}">
+                      <a16:creationId xmlns:a16="http://schemas.microsoft.com/office/drawing/2014/main" id="{1920B37A-5CAF-F551-0164-1AFEEAB73931}"/>
+                    </a:ext>
+                  </a:extLst>
+                </p:cNvPr>
+                <p:cNvSpPr/>
+                <p:nvPr/>
+              </p:nvSpPr>
+              <p:spPr>
+                <a:xfrm>
+                  <a:off x="5111592" y="3792579"/>
+                  <a:ext cx="1914515" cy="559892"/>
+                </a:xfrm>
+                <a:prstGeom prst="hexagon">
+                  <a:avLst/>
+                </a:prstGeom>
+                <a:solidFill>
+                  <a:schemeClr val="accent5">
+                    <a:lumMod val="40000"/>
+                    <a:lumOff val="60000"/>
+                  </a:schemeClr>
+                </a:solidFill>
+                <a:ln>
+                  <a:noFill/>
+                </a:ln>
+              </p:spPr>
+              <p:style>
+                <a:lnRef idx="2">
+                  <a:schemeClr val="accent1">
+                    <a:shade val="15000"/>
+                  </a:schemeClr>
+                </a:lnRef>
+                <a:fillRef idx="1">
+                  <a:schemeClr val="accent1"/>
+                </a:fillRef>
+                <a:effectRef idx="0">
+                  <a:schemeClr val="accent1"/>
+                </a:effectRef>
+                <a:fontRef idx="minor">
+                  <a:schemeClr val="lt1"/>
+                </a:fontRef>
+              </p:style>
+              <p:txBody>
+                <a:bodyPr rtlCol="0" anchor="ctr"/>
+                <a:lstStyle/>
+                <a:p>
+                  <a:pPr algn="ctr"/>
+                  <a:endParaRPr lang="ko-KR" altLang="en-US"/>
+                </a:p>
+              </p:txBody>
+            </p:sp>
+            <p:sp>
+              <p:nvSpPr>
+                <p:cNvPr id="19" name="육각형 18">
+                  <a:extLst>
+                    <a:ext uri="{FF2B5EF4-FFF2-40B4-BE49-F238E27FC236}">
+                      <a16:creationId xmlns:a16="http://schemas.microsoft.com/office/drawing/2014/main" id="{D0F92486-5EED-0E72-59D0-FA44EE17B9CA}"/>
+                    </a:ext>
+                  </a:extLst>
+                </p:cNvPr>
+                <p:cNvSpPr/>
+                <p:nvPr/>
+              </p:nvSpPr>
+              <p:spPr>
+                <a:xfrm rot="1800000">
+                  <a:off x="5493560" y="3573572"/>
+                  <a:ext cx="1118126" cy="990205"/>
+                </a:xfrm>
+                <a:prstGeom prst="hexagon">
+                  <a:avLst>
+                    <a:gd name="adj" fmla="val 26801"/>
+                    <a:gd name="vf" fmla="val 115470"/>
+                  </a:avLst>
+                </a:prstGeom>
+                <a:ln>
+                  <a:noFill/>
+                </a:ln>
+              </p:spPr>
+              <p:style>
+                <a:lnRef idx="2">
+                  <a:schemeClr val="accent1">
+                    <a:shade val="15000"/>
+                  </a:schemeClr>
+                </a:lnRef>
+                <a:fillRef idx="1">
+                  <a:schemeClr val="accent1"/>
+                </a:fillRef>
+                <a:effectRef idx="0">
+                  <a:schemeClr val="accent1"/>
+                </a:effectRef>
+                <a:fontRef idx="minor">
+                  <a:schemeClr val="lt1"/>
+                </a:fontRef>
+              </p:style>
+              <p:txBody>
+                <a:bodyPr rtlCol="0" anchor="ctr"/>
+                <a:lstStyle/>
+                <a:p>
+                  <a:pPr algn="ctr"/>
+                  <a:endParaRPr lang="ko-KR" altLang="en-US"/>
+                </a:p>
+              </p:txBody>
+            </p:sp>
+            <p:sp>
+              <p:nvSpPr>
+                <p:cNvPr id="16" name="육각형 15">
+                  <a:extLst>
+                    <a:ext uri="{FF2B5EF4-FFF2-40B4-BE49-F238E27FC236}">
+                      <a16:creationId xmlns:a16="http://schemas.microsoft.com/office/drawing/2014/main" id="{7A385025-30BF-E6A8-8C71-8275E52F659F}"/>
+                    </a:ext>
+                  </a:extLst>
+                </p:cNvPr>
+                <p:cNvSpPr/>
+                <p:nvPr/>
+              </p:nvSpPr>
+              <p:spPr>
+                <a:xfrm>
+                  <a:off x="5389234" y="3959022"/>
+                  <a:ext cx="1357833" cy="183902"/>
+                </a:xfrm>
+                <a:prstGeom prst="hexagon">
+                  <a:avLst/>
+                </a:prstGeom>
+                <a:solidFill>
+                  <a:schemeClr val="accent4">
+                    <a:lumMod val="75000"/>
+                  </a:schemeClr>
+                </a:solidFill>
+                <a:ln>
+                  <a:noFill/>
+                </a:ln>
+              </p:spPr>
+              <p:style>
+                <a:lnRef idx="2">
+                  <a:schemeClr val="accent1">
+                    <a:shade val="15000"/>
+                  </a:schemeClr>
+                </a:lnRef>
+                <a:fillRef idx="1">
+                  <a:schemeClr val="accent1"/>
+                </a:fillRef>
+                <a:effectRef idx="0">
+                  <a:schemeClr val="accent1"/>
+                </a:effectRef>
+                <a:fontRef idx="minor">
+                  <a:schemeClr val="lt1"/>
+                </a:fontRef>
+              </p:style>
+              <p:txBody>
+                <a:bodyPr rtlCol="0" anchor="ctr"/>
+                <a:lstStyle/>
+                <a:p>
+                  <a:pPr algn="ctr"/>
+                  <a:r>
+                    <a:rPr lang="en-US" altLang="ko-KR" sz="1100" dirty="0"/>
+                    <a:t>Membership</a:t>
+                  </a:r>
+                  <a:endParaRPr lang="ko-KR" altLang="en-US" sz="1100" dirty="0"/>
+                </a:p>
+              </p:txBody>
+            </p:sp>
+          </p:grpSp>
+          <p:sp>
+            <p:nvSpPr>
+              <p:cNvPr id="47" name="TextBox 46">
+                <a:extLst>
+                  <a:ext uri="{FF2B5EF4-FFF2-40B4-BE49-F238E27FC236}">
+                    <a16:creationId xmlns:a16="http://schemas.microsoft.com/office/drawing/2014/main" id="{3942747E-663A-3A96-079A-8A749F1864B3}"/>
+                  </a:ext>
+                </a:extLst>
+              </p:cNvPr>
+              <p:cNvSpPr txBox="1"/>
+              <p:nvPr/>
+            </p:nvSpPr>
+            <p:spPr>
+              <a:xfrm>
+                <a:off x="5750519" y="2924705"/>
+                <a:ext cx="1185484" cy="253916"/>
+              </a:xfrm>
+              <a:prstGeom prst="rect">
+                <a:avLst/>
+              </a:prstGeom>
+              <a:noFill/>
+            </p:spPr>
+            <p:txBody>
+              <a:bodyPr wrap="square" rtlCol="0">
+                <a:spAutoFit/>
+              </a:bodyPr>
+              <a:lstStyle/>
+              <a:p>
+                <a:pPr algn="ctr"/>
+                <a:r>
+                  <a:rPr lang="ko-KR" altLang="en-US" sz="1000" b="1" dirty="0">
+                    <a:solidFill>
+                      <a:schemeClr val="bg1">
+                        <a:lumMod val="95000"/>
+                      </a:schemeClr>
+                    </a:solidFill>
+                  </a:rPr>
+                  <a:t>회원 정보</a:t>
+                </a:r>
+                <a:endParaRPr lang="ko-KR" altLang="en-US" sz="1050" b="1" dirty="0">
+                  <a:solidFill>
+                    <a:schemeClr val="bg1">
+                      <a:lumMod val="95000"/>
+                    </a:schemeClr>
+                  </a:solidFill>
+                </a:endParaRPr>
+              </a:p>
+            </p:txBody>
+          </p:sp>
+          <p:sp>
+            <p:nvSpPr>
+              <p:cNvPr id="48" name="TextBox 47">
+                <a:extLst>
+                  <a:ext uri="{FF2B5EF4-FFF2-40B4-BE49-F238E27FC236}">
+                    <a16:creationId xmlns:a16="http://schemas.microsoft.com/office/drawing/2014/main" id="{F84DA786-135F-7611-E063-9C75FD73DC80}"/>
+                  </a:ext>
+                </a:extLst>
+              </p:cNvPr>
+              <p:cNvSpPr txBox="1"/>
+              <p:nvPr/>
+            </p:nvSpPr>
+            <p:spPr>
+              <a:xfrm>
+                <a:off x="5750519" y="3349219"/>
+                <a:ext cx="1185484" cy="246221"/>
+              </a:xfrm>
+              <a:prstGeom prst="rect">
+                <a:avLst/>
+              </a:prstGeom>
+              <a:noFill/>
+            </p:spPr>
+            <p:txBody>
+              <a:bodyPr wrap="square" rtlCol="0">
+                <a:spAutoFit/>
+              </a:bodyPr>
+              <a:lstStyle/>
+              <a:p>
+                <a:pPr algn="ctr"/>
+                <a:r>
+                  <a:rPr lang="ko-KR" altLang="en-US" sz="1000" b="1" dirty="0">
+                    <a:solidFill>
+                      <a:schemeClr val="bg1">
+                        <a:lumMod val="95000"/>
+                      </a:schemeClr>
+                    </a:solidFill>
+                  </a:rPr>
+                  <a:t>등록</a:t>
+                </a:r>
+                <a:r>
+                  <a:rPr lang="en-US" altLang="ko-KR" sz="1000" b="1" dirty="0">
+                    <a:solidFill>
+                      <a:schemeClr val="bg1">
+                        <a:lumMod val="95000"/>
+                      </a:schemeClr>
+                    </a:solidFill>
+                  </a:rPr>
+                  <a:t>, </a:t>
+                </a:r>
+                <a:r>
+                  <a:rPr lang="ko-KR" altLang="en-US" sz="1000" b="1" dirty="0">
+                    <a:solidFill>
+                      <a:schemeClr val="bg1">
+                        <a:lumMod val="95000"/>
+                      </a:schemeClr>
+                    </a:solidFill>
+                  </a:rPr>
+                  <a:t>수정</a:t>
+                </a:r>
+                <a:r>
+                  <a:rPr lang="en-US" altLang="ko-KR" sz="1000" b="1" dirty="0">
+                    <a:solidFill>
+                      <a:schemeClr val="bg1">
+                        <a:lumMod val="95000"/>
+                      </a:schemeClr>
+                    </a:solidFill>
+                  </a:rPr>
+                  <a:t>, </a:t>
+                </a:r>
+                <a:r>
+                  <a:rPr lang="ko-KR" altLang="en-US" sz="1000" b="1" dirty="0">
+                    <a:solidFill>
+                      <a:schemeClr val="bg1">
+                        <a:lumMod val="95000"/>
+                      </a:schemeClr>
+                    </a:solidFill>
+                  </a:rPr>
+                  <a:t>찾기</a:t>
+                </a:r>
+                <a:endParaRPr lang="ko-KR" altLang="en-US" sz="1050" b="1" dirty="0">
+                  <a:solidFill>
+                    <a:schemeClr val="bg1">
+                      <a:lumMod val="95000"/>
+                    </a:schemeClr>
+                  </a:solidFill>
+                </a:endParaRPr>
+              </a:p>
+            </p:txBody>
+          </p:sp>
+          <p:cxnSp>
+            <p:nvCxnSpPr>
+              <p:cNvPr id="49" name="직선 화살표 연결선 48">
+                <a:extLst>
+                  <a:ext uri="{FF2B5EF4-FFF2-40B4-BE49-F238E27FC236}">
+                    <a16:creationId xmlns:a16="http://schemas.microsoft.com/office/drawing/2014/main" id="{0579CC2F-C935-AE7E-8FA0-AE47EB6DD587}"/>
+                  </a:ext>
+                </a:extLst>
+              </p:cNvPr>
+              <p:cNvCxnSpPr/>
+              <p:nvPr/>
+            </p:nvCxnSpPr>
+            <p:spPr>
+              <a:xfrm>
+                <a:off x="4625634" y="3216417"/>
+                <a:ext cx="281858" cy="0"/>
+              </a:xfrm>
+              <a:prstGeom prst="straightConnector1">
+                <a:avLst/>
+              </a:prstGeom>
+              <a:ln w="19050">
+                <a:solidFill>
+                  <a:schemeClr val="bg1">
+                    <a:lumMod val="50000"/>
+                  </a:schemeClr>
+                </a:solidFill>
+                <a:tailEnd type="triangle" w="sm" len="med"/>
+              </a:ln>
+            </p:spPr>
+            <p:style>
+              <a:lnRef idx="1">
+                <a:schemeClr val="accent1"/>
+              </a:lnRef>
+              <a:fillRef idx="0">
+                <a:schemeClr val="accent1"/>
+              </a:fillRef>
+              <a:effectRef idx="0">
+                <a:schemeClr val="accent1"/>
+              </a:effectRef>
+              <a:fontRef idx="minor">
+                <a:schemeClr val="tx1"/>
+              </a:fontRef>
+            </p:style>
+          </p:cxnSp>
+          <p:cxnSp>
+            <p:nvCxnSpPr>
+              <p:cNvPr id="50" name="직선 화살표 연결선 49">
+                <a:extLst>
+                  <a:ext uri="{FF2B5EF4-FFF2-40B4-BE49-F238E27FC236}">
+                    <a16:creationId xmlns:a16="http://schemas.microsoft.com/office/drawing/2014/main" id="{C5D315A6-8CBA-9064-9662-EB4F5F4E8889}"/>
+                  </a:ext>
+                </a:extLst>
+              </p:cNvPr>
+              <p:cNvCxnSpPr>
+                <a:cxnSpLocks/>
+              </p:cNvCxnSpPr>
+              <p:nvPr/>
+            </p:nvCxnSpPr>
+            <p:spPr>
+              <a:xfrm rot="10800000">
+                <a:off x="4625634" y="3325446"/>
+                <a:ext cx="281858" cy="0"/>
+              </a:xfrm>
+              <a:prstGeom prst="straightConnector1">
+                <a:avLst/>
+              </a:prstGeom>
+              <a:ln w="19050">
+                <a:solidFill>
+                  <a:schemeClr val="bg1">
+                    <a:lumMod val="50000"/>
+                  </a:schemeClr>
+                </a:solidFill>
+                <a:tailEnd type="triangle" w="sm" len="med"/>
+              </a:ln>
+            </p:spPr>
+            <p:style>
+              <a:lnRef idx="1">
+                <a:schemeClr val="accent1"/>
+              </a:lnRef>
+              <a:fillRef idx="0">
+                <a:schemeClr val="accent1"/>
+              </a:fillRef>
+              <a:effectRef idx="0">
+                <a:schemeClr val="accent1"/>
+              </a:effectRef>
+              <a:fontRef idx="minor">
+                <a:schemeClr val="tx1"/>
+              </a:fontRef>
+            </p:style>
+          </p:cxnSp>
+          <p:cxnSp>
+            <p:nvCxnSpPr>
+              <p:cNvPr id="51" name="직선 화살표 연결선 50">
+                <a:extLst>
+                  <a:ext uri="{FF2B5EF4-FFF2-40B4-BE49-F238E27FC236}">
+                    <a16:creationId xmlns:a16="http://schemas.microsoft.com/office/drawing/2014/main" id="{2A6FE596-B5F8-48F3-6FD2-BFB29A01BBBB}"/>
+                  </a:ext>
+                </a:extLst>
+              </p:cNvPr>
+              <p:cNvCxnSpPr/>
+              <p:nvPr/>
+            </p:nvCxnSpPr>
+            <p:spPr>
+              <a:xfrm>
+                <a:off x="7747176" y="3225411"/>
+                <a:ext cx="281858" cy="0"/>
+              </a:xfrm>
+              <a:prstGeom prst="straightConnector1">
+                <a:avLst/>
+              </a:prstGeom>
+              <a:ln w="19050">
+                <a:solidFill>
+                  <a:schemeClr val="bg1">
+                    <a:lumMod val="50000"/>
+                  </a:schemeClr>
+                </a:solidFill>
+                <a:tailEnd type="triangle" w="sm" len="med"/>
+              </a:ln>
+            </p:spPr>
+            <p:style>
+              <a:lnRef idx="1">
+                <a:schemeClr val="accent1"/>
+              </a:lnRef>
+              <a:fillRef idx="0">
+                <a:schemeClr val="accent1"/>
+              </a:fillRef>
+              <a:effectRef idx="0">
+                <a:schemeClr val="accent1"/>
+              </a:effectRef>
+              <a:fontRef idx="minor">
+                <a:schemeClr val="tx1"/>
+              </a:fontRef>
+            </p:style>
+          </p:cxnSp>
+          <p:cxnSp>
+            <p:nvCxnSpPr>
+              <p:cNvPr id="52" name="직선 화살표 연결선 51">
+                <a:extLst>
+                  <a:ext uri="{FF2B5EF4-FFF2-40B4-BE49-F238E27FC236}">
+                    <a16:creationId xmlns:a16="http://schemas.microsoft.com/office/drawing/2014/main" id="{D16A5E89-A592-97B5-7130-D12076D8F1AB}"/>
+                  </a:ext>
+                </a:extLst>
+              </p:cNvPr>
+              <p:cNvCxnSpPr>
+                <a:cxnSpLocks/>
+              </p:cNvCxnSpPr>
+              <p:nvPr/>
+            </p:nvCxnSpPr>
+            <p:spPr>
+              <a:xfrm rot="10800000">
+                <a:off x="7747176" y="3334440"/>
+                <a:ext cx="281858" cy="0"/>
+              </a:xfrm>
+              <a:prstGeom prst="straightConnector1">
+                <a:avLst/>
+              </a:prstGeom>
+              <a:ln w="19050">
+                <a:solidFill>
+                  <a:schemeClr val="bg1">
+                    <a:lumMod val="50000"/>
+                  </a:schemeClr>
+                </a:solidFill>
+                <a:tailEnd type="triangle" w="sm" len="med"/>
+              </a:ln>
+            </p:spPr>
+            <p:style>
+              <a:lnRef idx="1">
+                <a:schemeClr val="accent1"/>
+              </a:lnRef>
+              <a:fillRef idx="0">
+                <a:schemeClr val="accent1"/>
+              </a:fillRef>
+              <a:effectRef idx="0">
+                <a:schemeClr val="accent1"/>
+              </a:effectRef>
+              <a:fontRef idx="minor">
+                <a:schemeClr val="tx1"/>
+              </a:fontRef>
+            </p:style>
+          </p:cxnSp>
+        </p:grpSp>
+      </p:grpSp>
+      <p:grpSp>
+        <p:nvGrpSpPr>
+          <p:cNvPr id="91" name="그룹 90">
+            <a:extLst>
+              <a:ext uri="{FF2B5EF4-FFF2-40B4-BE49-F238E27FC236}">
+                <a16:creationId xmlns:a16="http://schemas.microsoft.com/office/drawing/2014/main" id="{D973AC85-F816-3461-6286-E839D9EB0138}"/>
+              </a:ext>
+            </a:extLst>
+          </p:cNvPr>
+          <p:cNvGrpSpPr/>
+          <p:nvPr/>
+        </p:nvGrpSpPr>
+        <p:grpSpPr>
+          <a:xfrm>
+            <a:off x="3113166" y="3799912"/>
+            <a:ext cx="3398644" cy="1962044"/>
+            <a:chOff x="4731473" y="3797195"/>
+            <a:chExt cx="3398644" cy="1962044"/>
+          </a:xfrm>
+        </p:grpSpPr>
+        <p:grpSp>
+          <p:nvGrpSpPr>
+            <p:cNvPr id="86" name="그룹 85">
+              <a:extLst>
+                <a:ext uri="{FF2B5EF4-FFF2-40B4-BE49-F238E27FC236}">
+                  <a16:creationId xmlns:a16="http://schemas.microsoft.com/office/drawing/2014/main" id="{F0D4E1F2-E20C-A040-3CB8-D6FBD75A6824}"/>
+                </a:ext>
+              </a:extLst>
+            </p:cNvPr>
+            <p:cNvGrpSpPr/>
+            <p:nvPr/>
+          </p:nvGrpSpPr>
+          <p:grpSpPr>
+            <a:xfrm rot="-1800000">
+              <a:off x="6087677" y="3797195"/>
+              <a:ext cx="1603704" cy="840108"/>
+              <a:chOff x="4408635" y="2989231"/>
+              <a:chExt cx="1603704" cy="840108"/>
+            </a:xfrm>
+          </p:grpSpPr>
+          <p:grpSp>
+            <p:nvGrpSpPr>
+              <p:cNvPr id="84" name="그룹 83">
+                <a:extLst>
+                  <a:ext uri="{FF2B5EF4-FFF2-40B4-BE49-F238E27FC236}">
+                    <a16:creationId xmlns:a16="http://schemas.microsoft.com/office/drawing/2014/main" id="{E3926CD0-C2B1-12F2-3846-7041B1BA2710}"/>
+                  </a:ext>
+                </a:extLst>
+              </p:cNvPr>
+              <p:cNvGrpSpPr/>
+              <p:nvPr/>
+            </p:nvGrpSpPr>
+            <p:grpSpPr>
+              <a:xfrm rot="10800000">
+                <a:off x="4408635" y="2989231"/>
+                <a:ext cx="1603704" cy="840108"/>
+                <a:chOff x="3859579" y="3008624"/>
+                <a:chExt cx="1603704" cy="840108"/>
+              </a:xfrm>
+            </p:grpSpPr>
+            <p:sp>
+              <p:nvSpPr>
+                <p:cNvPr id="79" name="육각형 78">
+                  <a:extLst>
+                    <a:ext uri="{FF2B5EF4-FFF2-40B4-BE49-F238E27FC236}">
+                      <a16:creationId xmlns:a16="http://schemas.microsoft.com/office/drawing/2014/main" id="{AF625239-E866-AFE5-1E32-50A68AE1700C}"/>
+                    </a:ext>
+                  </a:extLst>
+                </p:cNvPr>
+                <p:cNvSpPr/>
+                <p:nvPr/>
+              </p:nvSpPr>
+              <p:spPr>
+                <a:xfrm rot="19740000">
+                  <a:off x="4103304" y="3114325"/>
+                  <a:ext cx="1352609" cy="558725"/>
+                </a:xfrm>
+                <a:prstGeom prst="hexagon">
+                  <a:avLst/>
+                </a:prstGeom>
+                <a:solidFill>
+                  <a:schemeClr val="accent2">
+                    <a:lumMod val="20000"/>
+                    <a:lumOff val="80000"/>
+                  </a:schemeClr>
+                </a:solidFill>
+                <a:ln>
+                  <a:noFill/>
+                </a:ln>
+              </p:spPr>
+              <p:style>
+                <a:lnRef idx="2">
+                  <a:schemeClr val="accent1">
+                    <a:shade val="15000"/>
+                  </a:schemeClr>
+                </a:lnRef>
+                <a:fillRef idx="1">
+                  <a:schemeClr val="accent1"/>
+                </a:fillRef>
+                <a:effectRef idx="0">
+                  <a:schemeClr val="accent1"/>
+                </a:effectRef>
+                <a:fontRef idx="minor">
+                  <a:schemeClr val="lt1"/>
+                </a:fontRef>
+              </p:style>
+              <p:txBody>
+                <a:bodyPr rtlCol="0" anchor="ctr"/>
+                <a:lstStyle/>
+                <a:p>
+                  <a:pPr algn="ctr"/>
+                  <a:endParaRPr lang="ko-KR" altLang="en-US"/>
+                </a:p>
+              </p:txBody>
+            </p:sp>
+            <p:sp>
+              <p:nvSpPr>
+                <p:cNvPr id="80" name="육각형 79">
+                  <a:extLst>
+                    <a:ext uri="{FF2B5EF4-FFF2-40B4-BE49-F238E27FC236}">
+                      <a16:creationId xmlns:a16="http://schemas.microsoft.com/office/drawing/2014/main" id="{E01B5879-D16A-8DD8-8E10-41B52B405E9E}"/>
+                    </a:ext>
+                  </a:extLst>
+                </p:cNvPr>
+                <p:cNvSpPr/>
+                <p:nvPr/>
+              </p:nvSpPr>
+              <p:spPr>
+                <a:xfrm rot="19740000">
+                  <a:off x="4443550" y="3008624"/>
+                  <a:ext cx="1019733" cy="559892"/>
+                </a:xfrm>
+                <a:prstGeom prst="hexagon">
+                  <a:avLst/>
+                </a:prstGeom>
+                <a:solidFill>
+                  <a:schemeClr val="accent5">
+                    <a:lumMod val="40000"/>
+                    <a:lumOff val="60000"/>
+                  </a:schemeClr>
+                </a:solidFill>
+                <a:ln>
+                  <a:noFill/>
+                </a:ln>
+              </p:spPr>
+              <p:style>
+                <a:lnRef idx="2">
+                  <a:schemeClr val="accent1">
+                    <a:shade val="15000"/>
+                  </a:schemeClr>
+                </a:lnRef>
+                <a:fillRef idx="1">
+                  <a:schemeClr val="accent1"/>
+                </a:fillRef>
+                <a:effectRef idx="0">
+                  <a:schemeClr val="accent1"/>
+                </a:effectRef>
+                <a:fontRef idx="minor">
+                  <a:schemeClr val="lt1"/>
+                </a:fontRef>
+              </p:style>
+              <p:txBody>
+                <a:bodyPr rtlCol="0" anchor="ctr"/>
+                <a:lstStyle/>
+                <a:p>
+                  <a:pPr algn="ctr"/>
+                  <a:endParaRPr lang="ko-KR" altLang="en-US"/>
+                </a:p>
+              </p:txBody>
+            </p:sp>
+            <p:cxnSp>
+              <p:nvCxnSpPr>
+                <p:cNvPr id="82" name="직선 화살표 연결선 81">
+                  <a:extLst>
+                    <a:ext uri="{FF2B5EF4-FFF2-40B4-BE49-F238E27FC236}">
+                      <a16:creationId xmlns:a16="http://schemas.microsoft.com/office/drawing/2014/main" id="{C1517B61-C82A-9388-EBF9-6EA81DB77641}"/>
+                    </a:ext>
+                  </a:extLst>
+                </p:cNvPr>
+                <p:cNvCxnSpPr/>
+                <p:nvPr/>
+              </p:nvCxnSpPr>
+              <p:spPr>
+                <a:xfrm rot="19740000">
+                  <a:off x="3859579" y="3755275"/>
+                  <a:ext cx="281858" cy="0"/>
+                </a:xfrm>
+                <a:prstGeom prst="straightConnector1">
+                  <a:avLst/>
+                </a:prstGeom>
+                <a:ln w="19050">
+                  <a:solidFill>
+                    <a:schemeClr val="bg1">
+                      <a:lumMod val="50000"/>
+                    </a:schemeClr>
+                  </a:solidFill>
+                  <a:tailEnd type="triangle" w="sm" len="med"/>
+                </a:ln>
+              </p:spPr>
+              <p:style>
+                <a:lnRef idx="1">
+                  <a:schemeClr val="accent1"/>
+                </a:lnRef>
+                <a:fillRef idx="0">
+                  <a:schemeClr val="accent1"/>
+                </a:fillRef>
+                <a:effectRef idx="0">
+                  <a:schemeClr val="accent1"/>
+                </a:effectRef>
+                <a:fontRef idx="minor">
+                  <a:schemeClr val="tx1"/>
+                </a:fontRef>
+              </p:style>
+            </p:cxnSp>
+            <p:cxnSp>
+              <p:nvCxnSpPr>
+                <p:cNvPr id="83" name="직선 화살표 연결선 82">
+                  <a:extLst>
+                    <a:ext uri="{FF2B5EF4-FFF2-40B4-BE49-F238E27FC236}">
+                      <a16:creationId xmlns:a16="http://schemas.microsoft.com/office/drawing/2014/main" id="{A2502248-393A-9B61-27A6-30A883C626FD}"/>
+                    </a:ext>
+                  </a:extLst>
+                </p:cNvPr>
+                <p:cNvCxnSpPr>
+                  <a:cxnSpLocks/>
+                </p:cNvCxnSpPr>
+                <p:nvPr/>
+              </p:nvCxnSpPr>
+              <p:spPr>
+                <a:xfrm rot="8940000">
+                  <a:off x="3915734" y="3848732"/>
+                  <a:ext cx="281858" cy="0"/>
+                </a:xfrm>
+                <a:prstGeom prst="straightConnector1">
+                  <a:avLst/>
+                </a:prstGeom>
+                <a:ln w="19050">
+                  <a:solidFill>
+                    <a:schemeClr val="bg1">
+                      <a:lumMod val="50000"/>
+                    </a:schemeClr>
+                  </a:solidFill>
+                  <a:tailEnd type="triangle" w="sm" len="med"/>
+                </a:ln>
+              </p:spPr>
+              <p:style>
+                <a:lnRef idx="1">
+                  <a:schemeClr val="accent1"/>
+                </a:lnRef>
+                <a:fillRef idx="0">
+                  <a:schemeClr val="accent1"/>
+                </a:fillRef>
+                <a:effectRef idx="0">
+                  <a:schemeClr val="accent1"/>
+                </a:effectRef>
+                <a:fontRef idx="minor">
+                  <a:schemeClr val="tx1"/>
+                </a:fontRef>
+              </p:style>
+            </p:cxnSp>
+          </p:grpSp>
+          <p:sp>
+            <p:nvSpPr>
+              <p:cNvPr id="85" name="TextBox 84">
+                <a:extLst>
+                  <a:ext uri="{FF2B5EF4-FFF2-40B4-BE49-F238E27FC236}">
+                    <a16:creationId xmlns:a16="http://schemas.microsoft.com/office/drawing/2014/main" id="{0DF76FEF-87FC-ACCD-A139-B733C9D05A25}"/>
+                  </a:ext>
+                </a:extLst>
+              </p:cNvPr>
+              <p:cNvSpPr txBox="1"/>
+              <p:nvPr/>
+            </p:nvSpPr>
+            <p:spPr>
+              <a:xfrm rot="19740000">
+                <a:off x="4936979" y="3039044"/>
+                <a:ext cx="835479" cy="461665"/>
+              </a:xfrm>
+              <a:prstGeom prst="rect">
+                <a:avLst/>
+              </a:prstGeom>
+              <a:noFill/>
+            </p:spPr>
+            <p:txBody>
+              <a:bodyPr wrap="square" rtlCol="0">
+                <a:spAutoFit/>
+              </a:bodyPr>
+              <a:lstStyle/>
+              <a:p>
+                <a:pPr algn="ctr"/>
+                <a:r>
+                  <a:rPr lang="en-US" altLang="ko-KR" sz="800" dirty="0" err="1"/>
+                  <a:t>Memership</a:t>
+                </a:r>
+                <a:r>
+                  <a:rPr lang="ko-KR" altLang="en-US" sz="800" dirty="0"/>
+                  <a:t> </a:t>
+                </a:r>
+                <a:endParaRPr lang="en-US" altLang="ko-KR" sz="800" dirty="0"/>
+              </a:p>
+              <a:p>
+                <a:pPr algn="ctr"/>
+                <a:r>
+                  <a:rPr lang="ko-KR" altLang="en-US" sz="800" dirty="0"/>
+                  <a:t>회원 정보 </a:t>
+                </a:r>
+                <a:endParaRPr lang="en-US" altLang="ko-KR" sz="800" dirty="0"/>
+              </a:p>
+              <a:p>
+                <a:pPr algn="ctr"/>
+                <a:r>
+                  <a:rPr lang="ko-KR" altLang="en-US" sz="800" dirty="0"/>
+                  <a:t>유효성 확인</a:t>
+                </a:r>
+              </a:p>
+            </p:txBody>
+          </p:sp>
+        </p:grpSp>
+        <p:grpSp>
+          <p:nvGrpSpPr>
+            <p:cNvPr id="77" name="그룹 76">
+              <a:extLst>
+                <a:ext uri="{FF2B5EF4-FFF2-40B4-BE49-F238E27FC236}">
+                  <a16:creationId xmlns:a16="http://schemas.microsoft.com/office/drawing/2014/main" id="{4D379031-5CFE-D14C-4775-A170723B9599}"/>
+                </a:ext>
+              </a:extLst>
+            </p:cNvPr>
+            <p:cNvGrpSpPr/>
+            <p:nvPr/>
+          </p:nvGrpSpPr>
+          <p:grpSpPr>
+            <a:xfrm rot="-1800000">
+              <a:off x="5350907" y="5059456"/>
+              <a:ext cx="1617906" cy="699783"/>
+              <a:chOff x="2935263" y="2849604"/>
+              <a:chExt cx="1617906" cy="699783"/>
+            </a:xfrm>
+          </p:grpSpPr>
+          <p:grpSp>
+            <p:nvGrpSpPr>
+              <p:cNvPr id="73" name="그룹 72">
+                <a:extLst>
+                  <a:ext uri="{FF2B5EF4-FFF2-40B4-BE49-F238E27FC236}">
+                    <a16:creationId xmlns:a16="http://schemas.microsoft.com/office/drawing/2014/main" id="{774705B1-DCD2-0072-4B77-AFAC2C091513}"/>
+                  </a:ext>
+                </a:extLst>
+              </p:cNvPr>
+              <p:cNvGrpSpPr/>
+              <p:nvPr/>
+            </p:nvGrpSpPr>
+            <p:grpSpPr>
+              <a:xfrm>
+                <a:off x="3166054" y="2849604"/>
+                <a:ext cx="1387115" cy="591416"/>
+                <a:chOff x="3166054" y="2849604"/>
+                <a:chExt cx="1387115" cy="591416"/>
+              </a:xfrm>
+            </p:grpSpPr>
+            <p:grpSp>
+              <p:nvGrpSpPr>
+                <p:cNvPr id="68" name="그룹 67">
+                  <a:extLst>
+                    <a:ext uri="{FF2B5EF4-FFF2-40B4-BE49-F238E27FC236}">
+                      <a16:creationId xmlns:a16="http://schemas.microsoft.com/office/drawing/2014/main" id="{55AA9B09-E2F7-2E45-0EFC-9CD99C3CF622}"/>
+                    </a:ext>
+                  </a:extLst>
+                </p:cNvPr>
+                <p:cNvGrpSpPr/>
+                <p:nvPr/>
+              </p:nvGrpSpPr>
+              <p:grpSpPr>
+                <a:xfrm rot="-1860000">
+                  <a:off x="3166054" y="2849604"/>
+                  <a:ext cx="1387115" cy="575415"/>
+                  <a:chOff x="4365552" y="2375987"/>
+                  <a:chExt cx="1387115" cy="575415"/>
+                </a:xfrm>
+              </p:grpSpPr>
+              <p:sp>
+                <p:nvSpPr>
+                  <p:cNvPr id="66" name="육각형 65">
+                    <a:extLst>
+                      <a:ext uri="{FF2B5EF4-FFF2-40B4-BE49-F238E27FC236}">
+                        <a16:creationId xmlns:a16="http://schemas.microsoft.com/office/drawing/2014/main" id="{D4E0855C-40B7-2ADC-65BE-0F8A383C1C7E}"/>
+                      </a:ext>
+                    </a:extLst>
+                  </p:cNvPr>
+                  <p:cNvSpPr/>
+                  <p:nvPr/>
+                </p:nvSpPr>
+                <p:spPr>
+                  <a:xfrm rot="308386">
+                    <a:off x="4365552" y="2375987"/>
+                    <a:ext cx="1363666" cy="558725"/>
+                  </a:xfrm>
+                  <a:prstGeom prst="hexagon">
+                    <a:avLst/>
+                  </a:prstGeom>
+                  <a:solidFill>
+                    <a:schemeClr val="accent2">
+                      <a:lumMod val="20000"/>
+                      <a:lumOff val="80000"/>
+                    </a:schemeClr>
+                  </a:solidFill>
+                  <a:ln>
+                    <a:noFill/>
+                  </a:ln>
+                </p:spPr>
+                <p:style>
+                  <a:lnRef idx="2">
+                    <a:schemeClr val="accent1">
+                      <a:shade val="15000"/>
+                    </a:schemeClr>
+                  </a:lnRef>
+                  <a:fillRef idx="1">
+                    <a:schemeClr val="accent1"/>
+                  </a:fillRef>
+                  <a:effectRef idx="0">
+                    <a:schemeClr val="accent1"/>
+                  </a:effectRef>
+                  <a:fontRef idx="minor">
+                    <a:schemeClr val="lt1"/>
+                  </a:fontRef>
+                </p:style>
+                <p:txBody>
+                  <a:bodyPr rtlCol="0" anchor="ctr"/>
+                  <a:lstStyle/>
+                  <a:p>
+                    <a:pPr algn="ctr"/>
+                    <a:endParaRPr lang="ko-KR" altLang="en-US"/>
+                  </a:p>
+                </p:txBody>
+              </p:sp>
+              <p:sp>
+                <p:nvSpPr>
+                  <p:cNvPr id="67" name="육각형 66">
+                    <a:extLst>
+                      <a:ext uri="{FF2B5EF4-FFF2-40B4-BE49-F238E27FC236}">
+                        <a16:creationId xmlns:a16="http://schemas.microsoft.com/office/drawing/2014/main" id="{75BDA873-5B47-7798-9221-B0DAFE15D5CD}"/>
+                      </a:ext>
+                    </a:extLst>
+                  </p:cNvPr>
+                  <p:cNvSpPr/>
+                  <p:nvPr/>
+                </p:nvSpPr>
+                <p:spPr>
+                  <a:xfrm rot="308386">
+                    <a:off x="4732934" y="2391510"/>
+                    <a:ext cx="1019733" cy="559892"/>
+                  </a:xfrm>
+                  <a:prstGeom prst="hexagon">
+                    <a:avLst/>
+                  </a:prstGeom>
+                  <a:solidFill>
+                    <a:schemeClr val="accent5">
+                      <a:lumMod val="40000"/>
+                      <a:lumOff val="60000"/>
+                    </a:schemeClr>
+                  </a:solidFill>
+                  <a:ln>
+                    <a:noFill/>
+                  </a:ln>
+                </p:spPr>
+                <p:style>
+                  <a:lnRef idx="2">
+                    <a:schemeClr val="accent1">
+                      <a:shade val="15000"/>
+                    </a:schemeClr>
+                  </a:lnRef>
+                  <a:fillRef idx="1">
+                    <a:schemeClr val="accent1"/>
+                  </a:fillRef>
+                  <a:effectRef idx="0">
+                    <a:schemeClr val="accent1"/>
+                  </a:effectRef>
+                  <a:fontRef idx="minor">
+                    <a:schemeClr val="lt1"/>
+                  </a:fontRef>
+                </p:style>
+                <p:txBody>
+                  <a:bodyPr rtlCol="0" anchor="ctr"/>
+                  <a:lstStyle/>
+                  <a:p>
+                    <a:pPr algn="ctr"/>
+                    <a:endParaRPr lang="ko-KR" altLang="en-US"/>
+                  </a:p>
+                </p:txBody>
+              </p:sp>
+            </p:grpSp>
+            <p:sp>
+              <p:nvSpPr>
+                <p:cNvPr id="72" name="TextBox 71">
+                  <a:extLst>
+                    <a:ext uri="{FF2B5EF4-FFF2-40B4-BE49-F238E27FC236}">
+                      <a16:creationId xmlns:a16="http://schemas.microsoft.com/office/drawing/2014/main" id="{F26A8023-8C45-01A9-4536-52EE5A2EF717}"/>
+                    </a:ext>
+                  </a:extLst>
+                </p:cNvPr>
+                <p:cNvSpPr txBox="1"/>
+                <p:nvPr/>
+              </p:nvSpPr>
+              <p:spPr>
+                <a:xfrm rot="20048386">
+                  <a:off x="3228087" y="2979355"/>
+                  <a:ext cx="835479" cy="461665"/>
+                </a:xfrm>
+                <a:prstGeom prst="rect">
+                  <a:avLst/>
+                </a:prstGeom>
+                <a:noFill/>
+              </p:spPr>
+              <p:txBody>
+                <a:bodyPr wrap="square" rtlCol="0">
+                  <a:spAutoFit/>
+                </a:bodyPr>
+                <a:lstStyle/>
+                <a:p>
+                  <a:pPr algn="ctr"/>
+                  <a:r>
+                    <a:rPr lang="ko-KR" altLang="en-US" sz="800" dirty="0"/>
+                    <a:t>은행으로부터 </a:t>
+                  </a:r>
+                  <a:endParaRPr lang="en-US" altLang="ko-KR" sz="800" dirty="0"/>
+                </a:p>
+                <a:p>
+                  <a:pPr algn="ctr"/>
+                  <a:r>
+                    <a:rPr lang="ko-KR" altLang="en-US" sz="800" dirty="0"/>
+                    <a:t>회원 정보 </a:t>
+                  </a:r>
+                  <a:endParaRPr lang="en-US" altLang="ko-KR" sz="800" dirty="0"/>
+                </a:p>
+                <a:p>
+                  <a:pPr algn="ctr"/>
+                  <a:r>
+                    <a:rPr lang="ko-KR" altLang="en-US" sz="800" dirty="0"/>
+                    <a:t>유효성 확인</a:t>
+                  </a:r>
+                </a:p>
+              </p:txBody>
+            </p:sp>
+          </p:grpSp>
+          <p:grpSp>
+            <p:nvGrpSpPr>
+              <p:cNvPr id="76" name="그룹 75">
+                <a:extLst>
+                  <a:ext uri="{FF2B5EF4-FFF2-40B4-BE49-F238E27FC236}">
+                    <a16:creationId xmlns:a16="http://schemas.microsoft.com/office/drawing/2014/main" id="{7029D6ED-57A8-EDD3-E70A-20E79D02EA3D}"/>
+                  </a:ext>
+                </a:extLst>
+              </p:cNvPr>
+              <p:cNvGrpSpPr/>
+              <p:nvPr/>
+            </p:nvGrpSpPr>
+            <p:grpSpPr>
+              <a:xfrm rot="-1860000">
+                <a:off x="2935263" y="3440358"/>
+                <a:ext cx="281860" cy="109029"/>
+                <a:chOff x="3603378" y="1620132"/>
+                <a:chExt cx="281860" cy="109029"/>
+              </a:xfrm>
+            </p:grpSpPr>
+            <p:cxnSp>
+              <p:nvCxnSpPr>
+                <p:cNvPr id="74" name="직선 화살표 연결선 73">
+                  <a:extLst>
+                    <a:ext uri="{FF2B5EF4-FFF2-40B4-BE49-F238E27FC236}">
+                      <a16:creationId xmlns:a16="http://schemas.microsoft.com/office/drawing/2014/main" id="{BE2107B0-DEC3-4C8F-43B9-4DA4A51A4F7F}"/>
+                    </a:ext>
+                  </a:extLst>
+                </p:cNvPr>
+                <p:cNvCxnSpPr>
+                  <a:cxnSpLocks/>
+                </p:cNvCxnSpPr>
+                <p:nvPr/>
+              </p:nvCxnSpPr>
+              <p:spPr>
+                <a:xfrm rot="308386">
+                  <a:off x="3603380" y="1620132"/>
+                  <a:ext cx="281858" cy="0"/>
+                </a:xfrm>
+                <a:prstGeom prst="straightConnector1">
+                  <a:avLst/>
+                </a:prstGeom>
+                <a:ln w="19050">
+                  <a:solidFill>
+                    <a:schemeClr val="bg1">
+                      <a:lumMod val="50000"/>
+                    </a:schemeClr>
+                  </a:solidFill>
+                  <a:tailEnd type="triangle" w="sm" len="med"/>
+                </a:ln>
+              </p:spPr>
+              <p:style>
+                <a:lnRef idx="1">
+                  <a:schemeClr val="accent1"/>
+                </a:lnRef>
+                <a:fillRef idx="0">
+                  <a:schemeClr val="accent1"/>
+                </a:fillRef>
+                <a:effectRef idx="0">
+                  <a:schemeClr val="accent1"/>
+                </a:effectRef>
+                <a:fontRef idx="minor">
+                  <a:schemeClr val="tx1"/>
+                </a:fontRef>
+              </p:style>
+            </p:cxnSp>
+            <p:cxnSp>
+              <p:nvCxnSpPr>
+                <p:cNvPr id="75" name="직선 화살표 연결선 74">
+                  <a:extLst>
+                    <a:ext uri="{FF2B5EF4-FFF2-40B4-BE49-F238E27FC236}">
+                      <a16:creationId xmlns:a16="http://schemas.microsoft.com/office/drawing/2014/main" id="{61B4B016-4B5B-20C9-7B4B-5170E5E5B7D0}"/>
+                    </a:ext>
+                  </a:extLst>
+                </p:cNvPr>
+                <p:cNvCxnSpPr>
+                  <a:cxnSpLocks/>
+                </p:cNvCxnSpPr>
+                <p:nvPr/>
+              </p:nvCxnSpPr>
+              <p:spPr>
+                <a:xfrm rot="11108386">
+                  <a:off x="3603378" y="1729161"/>
+                  <a:ext cx="281858" cy="0"/>
+                </a:xfrm>
+                <a:prstGeom prst="straightConnector1">
+                  <a:avLst/>
+                </a:prstGeom>
+                <a:ln w="19050">
+                  <a:solidFill>
+                    <a:schemeClr val="bg1">
+                      <a:lumMod val="50000"/>
+                    </a:schemeClr>
+                  </a:solidFill>
+                  <a:tailEnd type="triangle" w="sm" len="med"/>
+                </a:ln>
+              </p:spPr>
+              <p:style>
+                <a:lnRef idx="1">
+                  <a:schemeClr val="accent1"/>
+                </a:lnRef>
+                <a:fillRef idx="0">
+                  <a:schemeClr val="accent1"/>
+                </a:fillRef>
+                <a:effectRef idx="0">
+                  <a:schemeClr val="accent1"/>
+                </a:effectRef>
+                <a:fontRef idx="minor">
+                  <a:schemeClr val="tx1"/>
+                </a:fontRef>
+              </p:style>
+            </p:cxnSp>
+          </p:grpSp>
+        </p:grpSp>
+        <p:grpSp>
+          <p:nvGrpSpPr>
+            <p:cNvPr id="54" name="그룹 53">
+              <a:extLst>
+                <a:ext uri="{FF2B5EF4-FFF2-40B4-BE49-F238E27FC236}">
+                  <a16:creationId xmlns:a16="http://schemas.microsoft.com/office/drawing/2014/main" id="{EB17D2D2-B4DF-4D5D-51E3-0480911521CA}"/>
+                </a:ext>
+              </a:extLst>
+            </p:cNvPr>
+            <p:cNvGrpSpPr/>
+            <p:nvPr/>
+          </p:nvGrpSpPr>
+          <p:grpSpPr>
+            <a:xfrm>
+              <a:off x="4731473" y="4282147"/>
+              <a:ext cx="3398644" cy="990205"/>
+              <a:chOff x="4553745" y="2779868"/>
+              <a:chExt cx="3398644" cy="990205"/>
+            </a:xfrm>
+          </p:grpSpPr>
+          <p:grpSp>
+            <p:nvGrpSpPr>
+              <p:cNvPr id="55" name="그룹 54">
+                <a:extLst>
+                  <a:ext uri="{FF2B5EF4-FFF2-40B4-BE49-F238E27FC236}">
+                    <a16:creationId xmlns:a16="http://schemas.microsoft.com/office/drawing/2014/main" id="{7592C95D-EC60-B152-91E8-0193787FA6B0}"/>
+                  </a:ext>
+                </a:extLst>
+              </p:cNvPr>
+              <p:cNvGrpSpPr/>
+              <p:nvPr/>
+            </p:nvGrpSpPr>
+            <p:grpSpPr>
+              <a:xfrm>
+                <a:off x="5091404" y="2779868"/>
+                <a:ext cx="2459726" cy="990205"/>
+                <a:chOff x="4796401" y="3573572"/>
+                <a:chExt cx="2459726" cy="990205"/>
+              </a:xfrm>
+            </p:grpSpPr>
+            <p:sp>
+              <p:nvSpPr>
+                <p:cNvPr id="62" name="육각형 61">
+                  <a:extLst>
+                    <a:ext uri="{FF2B5EF4-FFF2-40B4-BE49-F238E27FC236}">
+                      <a16:creationId xmlns:a16="http://schemas.microsoft.com/office/drawing/2014/main" id="{3CFDE45B-C912-AC7C-105F-E1A3CFA2C7A9}"/>
+                    </a:ext>
+                  </a:extLst>
+                </p:cNvPr>
+                <p:cNvSpPr/>
+                <p:nvPr/>
+              </p:nvSpPr>
+              <p:spPr>
+                <a:xfrm>
+                  <a:off x="4796401" y="3793746"/>
+                  <a:ext cx="2459726" cy="558725"/>
+                </a:xfrm>
+                <a:prstGeom prst="hexagon">
+                  <a:avLst/>
+                </a:prstGeom>
+                <a:solidFill>
+                  <a:schemeClr val="accent2">
+                    <a:lumMod val="20000"/>
+                    <a:lumOff val="80000"/>
+                  </a:schemeClr>
+                </a:solidFill>
+                <a:ln>
+                  <a:noFill/>
+                </a:ln>
+              </p:spPr>
+              <p:style>
+                <a:lnRef idx="2">
+                  <a:schemeClr val="accent1">
+                    <a:shade val="15000"/>
+                  </a:schemeClr>
+                </a:lnRef>
+                <a:fillRef idx="1">
+                  <a:schemeClr val="accent1"/>
+                </a:fillRef>
+                <a:effectRef idx="0">
+                  <a:schemeClr val="accent1"/>
+                </a:effectRef>
+                <a:fontRef idx="minor">
+                  <a:schemeClr val="lt1"/>
+                </a:fontRef>
+              </p:style>
+              <p:txBody>
+                <a:bodyPr rtlCol="0" anchor="ctr"/>
+                <a:lstStyle/>
+                <a:p>
+                  <a:pPr algn="ctr"/>
+                  <a:endParaRPr lang="ko-KR" altLang="en-US"/>
+                </a:p>
+              </p:txBody>
+            </p:sp>
+            <p:sp>
+              <p:nvSpPr>
+                <p:cNvPr id="63" name="육각형 62">
+                  <a:extLst>
+                    <a:ext uri="{FF2B5EF4-FFF2-40B4-BE49-F238E27FC236}">
+                      <a16:creationId xmlns:a16="http://schemas.microsoft.com/office/drawing/2014/main" id="{87C8EF25-A0CB-6337-8B01-EB0AF700AE8A}"/>
+                    </a:ext>
+                  </a:extLst>
+                </p:cNvPr>
+                <p:cNvSpPr/>
+                <p:nvPr/>
+              </p:nvSpPr>
+              <p:spPr>
+                <a:xfrm>
+                  <a:off x="5144298" y="3792579"/>
+                  <a:ext cx="1799517" cy="559892"/>
+                </a:xfrm>
+                <a:prstGeom prst="hexagon">
+                  <a:avLst/>
+                </a:prstGeom>
+                <a:solidFill>
+                  <a:schemeClr val="accent5">
+                    <a:lumMod val="40000"/>
+                    <a:lumOff val="60000"/>
+                  </a:schemeClr>
+                </a:solidFill>
+                <a:ln>
+                  <a:noFill/>
+                </a:ln>
+              </p:spPr>
+              <p:style>
+                <a:lnRef idx="2">
+                  <a:schemeClr val="accent1">
+                    <a:shade val="15000"/>
+                  </a:schemeClr>
+                </a:lnRef>
+                <a:fillRef idx="1">
+                  <a:schemeClr val="accent1"/>
+                </a:fillRef>
+                <a:effectRef idx="0">
+                  <a:schemeClr val="accent1"/>
+                </a:effectRef>
+                <a:fontRef idx="minor">
+                  <a:schemeClr val="lt1"/>
+                </a:fontRef>
+              </p:style>
+              <p:txBody>
+                <a:bodyPr rtlCol="0" anchor="ctr"/>
+                <a:lstStyle/>
+                <a:p>
+                  <a:pPr algn="ctr"/>
+                  <a:endParaRPr lang="ko-KR" altLang="en-US"/>
+                </a:p>
+              </p:txBody>
+            </p:sp>
+            <p:sp>
+              <p:nvSpPr>
+                <p:cNvPr id="64" name="육각형 63">
+                  <a:extLst>
+                    <a:ext uri="{FF2B5EF4-FFF2-40B4-BE49-F238E27FC236}">
+                      <a16:creationId xmlns:a16="http://schemas.microsoft.com/office/drawing/2014/main" id="{DA3D2941-5AE4-C767-DAEA-4A8621B56166}"/>
+                    </a:ext>
+                  </a:extLst>
+                </p:cNvPr>
+                <p:cNvSpPr/>
+                <p:nvPr/>
+              </p:nvSpPr>
+              <p:spPr>
+                <a:xfrm rot="1800000">
+                  <a:off x="5493560" y="3573572"/>
+                  <a:ext cx="1118126" cy="990205"/>
+                </a:xfrm>
+                <a:prstGeom prst="hexagon">
+                  <a:avLst>
+                    <a:gd name="adj" fmla="val 26801"/>
+                    <a:gd name="vf" fmla="val 115470"/>
+                  </a:avLst>
+                </a:prstGeom>
+                <a:ln>
+                  <a:noFill/>
+                </a:ln>
+              </p:spPr>
+              <p:style>
+                <a:lnRef idx="2">
+                  <a:schemeClr val="accent1">
+                    <a:shade val="15000"/>
+                  </a:schemeClr>
+                </a:lnRef>
+                <a:fillRef idx="1">
+                  <a:schemeClr val="accent1"/>
+                </a:fillRef>
+                <a:effectRef idx="0">
+                  <a:schemeClr val="accent1"/>
+                </a:effectRef>
+                <a:fontRef idx="minor">
+                  <a:schemeClr val="lt1"/>
+                </a:fontRef>
+              </p:style>
+              <p:txBody>
+                <a:bodyPr rtlCol="0" anchor="ctr"/>
+                <a:lstStyle/>
+                <a:p>
+                  <a:pPr algn="ctr"/>
+                  <a:endParaRPr lang="ko-KR" altLang="en-US"/>
+                </a:p>
+              </p:txBody>
+            </p:sp>
+            <p:sp>
+              <p:nvSpPr>
+                <p:cNvPr id="65" name="육각형 64">
+                  <a:extLst>
+                    <a:ext uri="{FF2B5EF4-FFF2-40B4-BE49-F238E27FC236}">
+                      <a16:creationId xmlns:a16="http://schemas.microsoft.com/office/drawing/2014/main" id="{95BA840A-1780-7DD8-9400-8941269DA1F5}"/>
+                    </a:ext>
+                  </a:extLst>
+                </p:cNvPr>
+                <p:cNvSpPr/>
+                <p:nvPr/>
+              </p:nvSpPr>
+              <p:spPr>
+                <a:xfrm>
+                  <a:off x="5566662" y="3972325"/>
+                  <a:ext cx="975079" cy="197634"/>
+                </a:xfrm>
+                <a:prstGeom prst="hexagon">
+                  <a:avLst/>
+                </a:prstGeom>
+                <a:solidFill>
+                  <a:schemeClr val="accent4">
+                    <a:lumMod val="75000"/>
+                  </a:schemeClr>
+                </a:solidFill>
+                <a:ln>
+                  <a:noFill/>
+                </a:ln>
+              </p:spPr>
+              <p:style>
+                <a:lnRef idx="2">
+                  <a:schemeClr val="accent1">
+                    <a:shade val="15000"/>
+                  </a:schemeClr>
+                </a:lnRef>
+                <a:fillRef idx="1">
+                  <a:schemeClr val="accent1"/>
+                </a:fillRef>
+                <a:effectRef idx="0">
+                  <a:schemeClr val="accent1"/>
+                </a:effectRef>
+                <a:fontRef idx="minor">
+                  <a:schemeClr val="lt1"/>
+                </a:fontRef>
+              </p:style>
+              <p:txBody>
+                <a:bodyPr rtlCol="0" anchor="ctr"/>
+                <a:lstStyle/>
+                <a:p>
+                  <a:pPr algn="ctr"/>
+                  <a:r>
+                    <a:rPr lang="en-US" altLang="ko-KR" sz="1100" dirty="0"/>
+                    <a:t> Banking</a:t>
+                  </a:r>
+                  <a:endParaRPr lang="ko-KR" altLang="en-US" sz="1100" dirty="0"/>
+                </a:p>
+              </p:txBody>
+            </p:sp>
+          </p:grpSp>
+          <p:sp>
+            <p:nvSpPr>
+              <p:cNvPr id="56" name="TextBox 55">
+                <a:extLst>
+                  <a:ext uri="{FF2B5EF4-FFF2-40B4-BE49-F238E27FC236}">
+                    <a16:creationId xmlns:a16="http://schemas.microsoft.com/office/drawing/2014/main" id="{0CA85981-3943-07CF-ADF2-96BAB56E616F}"/>
+                  </a:ext>
+                </a:extLst>
+              </p:cNvPr>
+              <p:cNvSpPr txBox="1"/>
+              <p:nvPr/>
+            </p:nvSpPr>
+            <p:spPr>
+              <a:xfrm>
+                <a:off x="5750519" y="2924705"/>
+                <a:ext cx="1185484" cy="253916"/>
+              </a:xfrm>
+              <a:prstGeom prst="rect">
+                <a:avLst/>
+              </a:prstGeom>
+              <a:noFill/>
+            </p:spPr>
+            <p:txBody>
+              <a:bodyPr wrap="square" rtlCol="0">
+                <a:spAutoFit/>
+              </a:bodyPr>
+              <a:lstStyle/>
+              <a:p>
+                <a:pPr algn="ctr"/>
+                <a:r>
+                  <a:rPr lang="ko-KR" altLang="en-US" sz="1000" b="1" dirty="0">
+                    <a:solidFill>
+                      <a:schemeClr val="bg1">
+                        <a:lumMod val="95000"/>
+                      </a:schemeClr>
+                    </a:solidFill>
+                  </a:rPr>
+                  <a:t>계좌</a:t>
+                </a:r>
+                <a:endParaRPr lang="ko-KR" altLang="en-US" sz="1050" b="1" dirty="0">
+                  <a:solidFill>
+                    <a:schemeClr val="bg1">
+                      <a:lumMod val="95000"/>
+                    </a:schemeClr>
+                  </a:solidFill>
+                </a:endParaRPr>
+              </a:p>
+            </p:txBody>
+          </p:sp>
+          <p:sp>
+            <p:nvSpPr>
+              <p:cNvPr id="57" name="TextBox 56">
+                <a:extLst>
+                  <a:ext uri="{FF2B5EF4-FFF2-40B4-BE49-F238E27FC236}">
+                    <a16:creationId xmlns:a16="http://schemas.microsoft.com/office/drawing/2014/main" id="{EC05EF07-B15A-08B5-26FE-46B3451E43EE}"/>
+                  </a:ext>
+                </a:extLst>
+              </p:cNvPr>
+              <p:cNvSpPr txBox="1"/>
+              <p:nvPr/>
+            </p:nvSpPr>
+            <p:spPr>
+              <a:xfrm>
+                <a:off x="5750519" y="3349219"/>
+                <a:ext cx="1185484" cy="246221"/>
+              </a:xfrm>
+              <a:prstGeom prst="rect">
+                <a:avLst/>
+              </a:prstGeom>
+              <a:noFill/>
+            </p:spPr>
+            <p:txBody>
+              <a:bodyPr wrap="square" rtlCol="0">
+                <a:spAutoFit/>
+              </a:bodyPr>
+              <a:lstStyle/>
+              <a:p>
+                <a:pPr algn="ctr"/>
+                <a:r>
+                  <a:rPr lang="ko-KR" altLang="en-US" sz="1000" b="1" dirty="0">
+                    <a:solidFill>
+                      <a:schemeClr val="bg1">
+                        <a:lumMod val="95000"/>
+                      </a:schemeClr>
+                    </a:solidFill>
+                  </a:rPr>
+                  <a:t>등록</a:t>
+                </a:r>
+                <a:endParaRPr lang="ko-KR" altLang="en-US" sz="1050" b="1" dirty="0">
+                  <a:solidFill>
+                    <a:schemeClr val="bg1">
+                      <a:lumMod val="95000"/>
+                    </a:schemeClr>
+                  </a:solidFill>
+                </a:endParaRPr>
+              </a:p>
+            </p:txBody>
+          </p:sp>
+          <p:cxnSp>
+            <p:nvCxnSpPr>
+              <p:cNvPr id="58" name="직선 화살표 연결선 57">
+                <a:extLst>
+                  <a:ext uri="{FF2B5EF4-FFF2-40B4-BE49-F238E27FC236}">
+                    <a16:creationId xmlns:a16="http://schemas.microsoft.com/office/drawing/2014/main" id="{CCDB9050-A71D-B444-220D-1CA50EF48A4E}"/>
+                  </a:ext>
+                </a:extLst>
+              </p:cNvPr>
+              <p:cNvCxnSpPr/>
+              <p:nvPr/>
+            </p:nvCxnSpPr>
+            <p:spPr>
+              <a:xfrm>
+                <a:off x="4553745" y="3220374"/>
+                <a:ext cx="281858" cy="0"/>
+              </a:xfrm>
+              <a:prstGeom prst="straightConnector1">
+                <a:avLst/>
+              </a:prstGeom>
+              <a:ln w="19050">
+                <a:solidFill>
+                  <a:schemeClr val="bg1">
+                    <a:lumMod val="50000"/>
+                  </a:schemeClr>
+                </a:solidFill>
+                <a:tailEnd type="triangle" w="sm" len="med"/>
+              </a:ln>
+            </p:spPr>
+            <p:style>
+              <a:lnRef idx="1">
+                <a:schemeClr val="accent1"/>
+              </a:lnRef>
+              <a:fillRef idx="0">
+                <a:schemeClr val="accent1"/>
+              </a:fillRef>
+              <a:effectRef idx="0">
+                <a:schemeClr val="accent1"/>
+              </a:effectRef>
+              <a:fontRef idx="minor">
+                <a:schemeClr val="tx1"/>
+              </a:fontRef>
+            </p:style>
+          </p:cxnSp>
+          <p:cxnSp>
+            <p:nvCxnSpPr>
+              <p:cNvPr id="59" name="직선 화살표 연결선 58">
+                <a:extLst>
+                  <a:ext uri="{FF2B5EF4-FFF2-40B4-BE49-F238E27FC236}">
+                    <a16:creationId xmlns:a16="http://schemas.microsoft.com/office/drawing/2014/main" id="{C38D25B4-836C-2D5A-A2BA-C8CB1B89D55B}"/>
+                  </a:ext>
+                </a:extLst>
+              </p:cNvPr>
+              <p:cNvCxnSpPr>
+                <a:cxnSpLocks/>
+              </p:cNvCxnSpPr>
+              <p:nvPr/>
+            </p:nvCxnSpPr>
+            <p:spPr>
+              <a:xfrm rot="10800000">
+                <a:off x="4553745" y="3329403"/>
+                <a:ext cx="281858" cy="0"/>
+              </a:xfrm>
+              <a:prstGeom prst="straightConnector1">
+                <a:avLst/>
+              </a:prstGeom>
+              <a:ln w="19050">
+                <a:solidFill>
+                  <a:schemeClr val="bg1">
+                    <a:lumMod val="50000"/>
+                  </a:schemeClr>
+                </a:solidFill>
+                <a:tailEnd type="triangle" w="sm" len="med"/>
+              </a:ln>
+            </p:spPr>
+            <p:style>
+              <a:lnRef idx="1">
+                <a:schemeClr val="accent1"/>
+              </a:lnRef>
+              <a:fillRef idx="0">
+                <a:schemeClr val="accent1"/>
+              </a:fillRef>
+              <a:effectRef idx="0">
+                <a:schemeClr val="accent1"/>
+              </a:effectRef>
+              <a:fontRef idx="minor">
+                <a:schemeClr val="tx1"/>
+              </a:fontRef>
+            </p:style>
+          </p:cxnSp>
+          <p:cxnSp>
+            <p:nvCxnSpPr>
+              <p:cNvPr id="60" name="직선 화살표 연결선 59">
+                <a:extLst>
+                  <a:ext uri="{FF2B5EF4-FFF2-40B4-BE49-F238E27FC236}">
+                    <a16:creationId xmlns:a16="http://schemas.microsoft.com/office/drawing/2014/main" id="{04DD29AE-ADBB-D88D-C574-C2D7717E0508}"/>
+                  </a:ext>
+                </a:extLst>
+              </p:cNvPr>
+              <p:cNvCxnSpPr/>
+              <p:nvPr/>
+            </p:nvCxnSpPr>
+            <p:spPr>
+              <a:xfrm>
+                <a:off x="7670531" y="3220374"/>
+                <a:ext cx="281858" cy="0"/>
+              </a:xfrm>
+              <a:prstGeom prst="straightConnector1">
+                <a:avLst/>
+              </a:prstGeom>
+              <a:ln w="19050">
+                <a:solidFill>
+                  <a:schemeClr val="bg1">
+                    <a:lumMod val="50000"/>
+                  </a:schemeClr>
+                </a:solidFill>
+                <a:tailEnd type="triangle" w="sm" len="med"/>
+              </a:ln>
+            </p:spPr>
+            <p:style>
+              <a:lnRef idx="1">
+                <a:schemeClr val="accent1"/>
+              </a:lnRef>
+              <a:fillRef idx="0">
+                <a:schemeClr val="accent1"/>
+              </a:fillRef>
+              <a:effectRef idx="0">
+                <a:schemeClr val="accent1"/>
+              </a:effectRef>
+              <a:fontRef idx="minor">
+                <a:schemeClr val="tx1"/>
+              </a:fontRef>
+            </p:style>
+          </p:cxnSp>
+          <p:cxnSp>
+            <p:nvCxnSpPr>
+              <p:cNvPr id="61" name="직선 화살표 연결선 60">
+                <a:extLst>
+                  <a:ext uri="{FF2B5EF4-FFF2-40B4-BE49-F238E27FC236}">
+                    <a16:creationId xmlns:a16="http://schemas.microsoft.com/office/drawing/2014/main" id="{C840341E-E0EA-CF91-9D10-392766FD3089}"/>
+                  </a:ext>
+                </a:extLst>
+              </p:cNvPr>
+              <p:cNvCxnSpPr>
+                <a:cxnSpLocks/>
+              </p:cNvCxnSpPr>
+              <p:nvPr/>
+            </p:nvCxnSpPr>
+            <p:spPr>
+              <a:xfrm rot="10800000">
+                <a:off x="7670531" y="3329403"/>
+                <a:ext cx="281858" cy="0"/>
+              </a:xfrm>
+              <a:prstGeom prst="straightConnector1">
+                <a:avLst/>
+              </a:prstGeom>
+              <a:ln w="19050">
+                <a:solidFill>
+                  <a:schemeClr val="bg1">
+                    <a:lumMod val="50000"/>
+                  </a:schemeClr>
+                </a:solidFill>
+                <a:tailEnd type="triangle" w="sm" len="med"/>
+              </a:ln>
+            </p:spPr>
+            <p:style>
+              <a:lnRef idx="1">
+                <a:schemeClr val="accent1"/>
+              </a:lnRef>
+              <a:fillRef idx="0">
+                <a:schemeClr val="accent1"/>
+              </a:fillRef>
+              <a:effectRef idx="0">
+                <a:schemeClr val="accent1"/>
+              </a:effectRef>
+              <a:fontRef idx="minor">
+                <a:schemeClr val="tx1"/>
+              </a:fontRef>
+            </p:style>
+          </p:cxnSp>
+        </p:grpSp>
+      </p:grpSp>
+    </p:spTree>
+    <p:extLst>
+      <p:ext uri="{BB962C8B-B14F-4D97-AF65-F5344CB8AC3E}">
+        <p14:creationId xmlns:p14="http://schemas.microsoft.com/office/powerpoint/2010/main" val="407112061"/>
+      </p:ext>
+    </p:extLst>
+  </p:cSld>
+  <p:clrMapOvr>
+    <a:masterClrMapping/>
+  </p:clrMapOvr>
+</p:sld>
+</file>
+
 <file path=ppt/theme/theme1.xml><?xml version="1.0" encoding="utf-8"?>
 <a:theme xmlns:a="http://schemas.openxmlformats.org/drawingml/2006/main" name="Office 테마">
   <a:themeElements>

</xml_diff>